<commit_message>
Added some supporting lAdditional updates to documents. Renamed some files
</commit_message>
<xml_diff>
--- a/docs/Advanced Spark Ingestion and Processing Line.pptx
+++ b/docs/Advanced Spark Ingestion and Processing Line.pptx
@@ -125,12 +125,12 @@
   <pc:docChgLst>
     <pc:chgData name="Drikus Dreyer" userId="2b911c4b7b469c0c" providerId="LiveId" clId="{0DD3C5B9-6664-49B6-8BA4-B3D15FACA8F0}"/>
     <pc:docChg chg="custSel modSld">
-      <pc:chgData name="Drikus Dreyer" userId="2b911c4b7b469c0c" providerId="LiveId" clId="{0DD3C5B9-6664-49B6-8BA4-B3D15FACA8F0}" dt="2019-11-27T23:11:01.387" v="369" actId="20577"/>
+      <pc:chgData name="Drikus Dreyer" userId="2b911c4b7b469c0c" providerId="LiveId" clId="{0DD3C5B9-6664-49B6-8BA4-B3D15FACA8F0}" dt="2019-11-28T19:58:29.101" v="371" actId="20577"/>
       <pc:docMkLst>
         <pc:docMk/>
       </pc:docMkLst>
       <pc:sldChg chg="addSp delSp modSp">
-        <pc:chgData name="Drikus Dreyer" userId="2b911c4b7b469c0c" providerId="LiveId" clId="{0DD3C5B9-6664-49B6-8BA4-B3D15FACA8F0}" dt="2019-11-27T23:11:01.387" v="369" actId="20577"/>
+        <pc:chgData name="Drikus Dreyer" userId="2b911c4b7b469c0c" providerId="LiveId" clId="{0DD3C5B9-6664-49B6-8BA4-B3D15FACA8F0}" dt="2019-11-28T19:58:29.101" v="371" actId="20577"/>
         <pc:sldMkLst>
           <pc:docMk/>
           <pc:sldMk cId="1003307221" sldId="256"/>
@@ -160,7 +160,7 @@
           </ac:spMkLst>
         </pc:spChg>
         <pc:spChg chg="add mod">
-          <ac:chgData name="Drikus Dreyer" userId="2b911c4b7b469c0c" providerId="LiveId" clId="{0DD3C5B9-6664-49B6-8BA4-B3D15FACA8F0}" dt="2019-11-27T22:59:47.392" v="103" actId="1076"/>
+          <ac:chgData name="Drikus Dreyer" userId="2b911c4b7b469c0c" providerId="LiveId" clId="{0DD3C5B9-6664-49B6-8BA4-B3D15FACA8F0}" dt="2019-11-28T19:58:29.101" v="371" actId="20577"/>
           <ac:spMkLst>
             <pc:docMk/>
             <pc:sldMk cId="1003307221" sldId="256"/>
@@ -402,7 +402,7 @@
           <a:p>
             <a:fld id="{77169A35-05C4-4856-85DB-F7A10820A363}" type="datetimeFigureOut">
               <a:rPr lang="en-AU" smtClean="0"/>
-              <a:t>28/11/2019</a:t>
+              <a:t>29/11/2019</a:t>
             </a:fld>
             <a:endParaRPr lang="en-AU"/>
           </a:p>
@@ -602,7 +602,7 @@
           <a:p>
             <a:fld id="{77169A35-05C4-4856-85DB-F7A10820A363}" type="datetimeFigureOut">
               <a:rPr lang="en-AU" smtClean="0"/>
-              <a:t>28/11/2019</a:t>
+              <a:t>29/11/2019</a:t>
             </a:fld>
             <a:endParaRPr lang="en-AU"/>
           </a:p>
@@ -812,7 +812,7 @@
           <a:p>
             <a:fld id="{77169A35-05C4-4856-85DB-F7A10820A363}" type="datetimeFigureOut">
               <a:rPr lang="en-AU" smtClean="0"/>
-              <a:t>28/11/2019</a:t>
+              <a:t>29/11/2019</a:t>
             </a:fld>
             <a:endParaRPr lang="en-AU"/>
           </a:p>
@@ -1012,7 +1012,7 @@
           <a:p>
             <a:fld id="{77169A35-05C4-4856-85DB-F7A10820A363}" type="datetimeFigureOut">
               <a:rPr lang="en-AU" smtClean="0"/>
-              <a:t>28/11/2019</a:t>
+              <a:t>29/11/2019</a:t>
             </a:fld>
             <a:endParaRPr lang="en-AU"/>
           </a:p>
@@ -1288,7 +1288,7 @@
           <a:p>
             <a:fld id="{77169A35-05C4-4856-85DB-F7A10820A363}" type="datetimeFigureOut">
               <a:rPr lang="en-AU" smtClean="0"/>
-              <a:t>28/11/2019</a:t>
+              <a:t>29/11/2019</a:t>
             </a:fld>
             <a:endParaRPr lang="en-AU"/>
           </a:p>
@@ -1556,7 +1556,7 @@
           <a:p>
             <a:fld id="{77169A35-05C4-4856-85DB-F7A10820A363}" type="datetimeFigureOut">
               <a:rPr lang="en-AU" smtClean="0"/>
-              <a:t>28/11/2019</a:t>
+              <a:t>29/11/2019</a:t>
             </a:fld>
             <a:endParaRPr lang="en-AU"/>
           </a:p>
@@ -1971,7 +1971,7 @@
           <a:p>
             <a:fld id="{77169A35-05C4-4856-85DB-F7A10820A363}" type="datetimeFigureOut">
               <a:rPr lang="en-AU" smtClean="0"/>
-              <a:t>28/11/2019</a:t>
+              <a:t>29/11/2019</a:t>
             </a:fld>
             <a:endParaRPr lang="en-AU"/>
           </a:p>
@@ -2113,7 +2113,7 @@
           <a:p>
             <a:fld id="{77169A35-05C4-4856-85DB-F7A10820A363}" type="datetimeFigureOut">
               <a:rPr lang="en-AU" smtClean="0"/>
-              <a:t>28/11/2019</a:t>
+              <a:t>29/11/2019</a:t>
             </a:fld>
             <a:endParaRPr lang="en-AU"/>
           </a:p>
@@ -2226,7 +2226,7 @@
           <a:p>
             <a:fld id="{77169A35-05C4-4856-85DB-F7A10820A363}" type="datetimeFigureOut">
               <a:rPr lang="en-AU" smtClean="0"/>
-              <a:t>28/11/2019</a:t>
+              <a:t>29/11/2019</a:t>
             </a:fld>
             <a:endParaRPr lang="en-AU"/>
           </a:p>
@@ -2539,7 +2539,7 @@
           <a:p>
             <a:fld id="{77169A35-05C4-4856-85DB-F7A10820A363}" type="datetimeFigureOut">
               <a:rPr lang="en-AU" smtClean="0"/>
-              <a:t>28/11/2019</a:t>
+              <a:t>29/11/2019</a:t>
             </a:fld>
             <a:endParaRPr lang="en-AU"/>
           </a:p>
@@ -2828,7 +2828,7 @@
           <a:p>
             <a:fld id="{77169A35-05C4-4856-85DB-F7A10820A363}" type="datetimeFigureOut">
               <a:rPr lang="en-AU" smtClean="0"/>
-              <a:t>28/11/2019</a:t>
+              <a:t>29/11/2019</a:t>
             </a:fld>
             <a:endParaRPr lang="en-AU"/>
           </a:p>
@@ -3071,7 +3071,7 @@
           <a:p>
             <a:fld id="{77169A35-05C4-4856-85DB-F7A10820A363}" type="datetimeFigureOut">
               <a:rPr lang="en-AU" smtClean="0"/>
-              <a:t>28/11/2019</a:t>
+              <a:t>29/11/2019</a:t>
             </a:fld>
             <a:endParaRPr lang="en-AU"/>
           </a:p>
@@ -4140,7 +4140,7 @@
             <a:pPr algn="ctr"/>
             <a:r>
               <a:rPr lang="en-AU" dirty="0"/>
-              <a:t>Refer (Fig.)</a:t>
+              <a:t>Refer (Fig. 3)</a:t>
             </a:r>
           </a:p>
         </p:txBody>

</xml_diff>

<commit_message>
Further updates to final report
</commit_message>
<xml_diff>
--- a/docs/Advanced Spark Ingestion and Processing Line.pptx
+++ b/docs/Advanced Spark Ingestion and Processing Line.pptx
@@ -115,7 +115,7 @@
 <file path=ppt/revisionInfo.xml><?xml version="1.0" encoding="utf-8"?>
 <p1510:revInfo xmlns:a="http://schemas.openxmlformats.org/drawingml/2006/main" xmlns:r="http://schemas.openxmlformats.org/officeDocument/2006/relationships" xmlns:p1510="http://schemas.microsoft.com/office/powerpoint/2015/10/main">
   <p1510:revLst>
-    <p1510:client id="{0DD3C5B9-6664-49B6-8BA4-B3D15FACA8F0}" v="15" dt="2019-11-27T23:10:47.526"/>
+    <p1510:client id="{0DD3C5B9-6664-49B6-8BA4-B3D15FACA8F0}" v="17" dt="2019-11-29T00:22:34.330"/>
   </p1510:revLst>
 </p1510:revInfo>
 </file>
@@ -123,18 +123,362 @@
 <file path=ppt/changesInfos/changesInfo1.xml><?xml version="1.0" encoding="utf-8"?>
 <pc:chgInfo xmlns:a="http://schemas.openxmlformats.org/drawingml/2006/main" xmlns:r="http://schemas.openxmlformats.org/officeDocument/2006/relationships" xmlns:ac="http://schemas.microsoft.com/office/drawing/2013/main/command" xmlns:pc="http://schemas.microsoft.com/office/powerpoint/2013/main/command">
   <pc:docChgLst>
-    <pc:chgData name="Drikus Dreyer" userId="2b911c4b7b469c0c" providerId="LiveId" clId="{0DD3C5B9-6664-49B6-8BA4-B3D15FACA8F0}"/>
-    <pc:docChg chg="custSel modSld">
-      <pc:chgData name="Drikus Dreyer" userId="2b911c4b7b469c0c" providerId="LiveId" clId="{0DD3C5B9-6664-49B6-8BA4-B3D15FACA8F0}" dt="2019-11-28T19:58:29.101" v="371" actId="20577"/>
+    <pc:chgData name="Drikus Dreyer" userId="2b911c4b7b469c0c" providerId="LiveId" clId="{66E06D5C-8E42-4D10-8A8E-9B7938918F0C}"/>
+    <pc:docChg chg="undo custSel modSld">
+      <pc:chgData name="Drikus Dreyer" userId="2b911c4b7b469c0c" providerId="LiveId" clId="{66E06D5C-8E42-4D10-8A8E-9B7938918F0C}" dt="2019-11-27T23:33:43.323" v="242" actId="14100"/>
       <pc:docMkLst>
         <pc:docMk/>
       </pc:docMkLst>
       <pc:sldChg chg="addSp delSp modSp">
-        <pc:chgData name="Drikus Dreyer" userId="2b911c4b7b469c0c" providerId="LiveId" clId="{0DD3C5B9-6664-49B6-8BA4-B3D15FACA8F0}" dt="2019-11-28T19:58:29.101" v="371" actId="20577"/>
+        <pc:chgData name="Drikus Dreyer" userId="2b911c4b7b469c0c" providerId="LiveId" clId="{66E06D5C-8E42-4D10-8A8E-9B7938918F0C}" dt="2019-11-27T23:33:43.323" v="242" actId="14100"/>
         <pc:sldMkLst>
           <pc:docMk/>
           <pc:sldMk cId="1003307221" sldId="256"/>
         </pc:sldMkLst>
+        <pc:spChg chg="mod">
+          <ac:chgData name="Drikus Dreyer" userId="2b911c4b7b469c0c" providerId="LiveId" clId="{66E06D5C-8E42-4D10-8A8E-9B7938918F0C}" dt="2019-11-27T23:32:59.016" v="237" actId="14100"/>
+          <ac:spMkLst>
+            <pc:docMk/>
+            <pc:sldMk cId="1003307221" sldId="256"/>
+            <ac:spMk id="5" creationId="{AB3EFA6B-E01E-423C-925C-DF6065185698}"/>
+          </ac:spMkLst>
+        </pc:spChg>
+        <pc:spChg chg="mod">
+          <ac:chgData name="Drikus Dreyer" userId="2b911c4b7b469c0c" providerId="LiveId" clId="{66E06D5C-8E42-4D10-8A8E-9B7938918F0C}" dt="2019-11-27T23:33:04.198" v="238" actId="1076"/>
+          <ac:spMkLst>
+            <pc:docMk/>
+            <pc:sldMk cId="1003307221" sldId="256"/>
+            <ac:spMk id="6" creationId="{9D5EC7F8-D512-4958-97C2-36027496DD2A}"/>
+          </ac:spMkLst>
+        </pc:spChg>
+        <pc:spChg chg="mod">
+          <ac:chgData name="Drikus Dreyer" userId="2b911c4b7b469c0c" providerId="LiveId" clId="{66E06D5C-8E42-4D10-8A8E-9B7938918F0C}" dt="2019-11-27T23:13:40.287" v="1" actId="1076"/>
+          <ac:spMkLst>
+            <pc:docMk/>
+            <pc:sldMk cId="1003307221" sldId="256"/>
+            <ac:spMk id="7" creationId="{51F95D80-FAE9-4D77-B52D-041338080F20}"/>
+          </ac:spMkLst>
+        </pc:spChg>
+        <pc:spChg chg="mod">
+          <ac:chgData name="Drikus Dreyer" userId="2b911c4b7b469c0c" providerId="LiveId" clId="{66E06D5C-8E42-4D10-8A8E-9B7938918F0C}" dt="2019-11-27T23:13:40.287" v="1" actId="1076"/>
+          <ac:spMkLst>
+            <pc:docMk/>
+            <pc:sldMk cId="1003307221" sldId="256"/>
+            <ac:spMk id="8" creationId="{D80EBE1C-A20F-494E-86D6-AA10922F1ED8}"/>
+          </ac:spMkLst>
+        </pc:spChg>
+        <pc:spChg chg="mod">
+          <ac:chgData name="Drikus Dreyer" userId="2b911c4b7b469c0c" providerId="LiveId" clId="{66E06D5C-8E42-4D10-8A8E-9B7938918F0C}" dt="2019-11-27T23:14:11.260" v="4" actId="1076"/>
+          <ac:spMkLst>
+            <pc:docMk/>
+            <pc:sldMk cId="1003307221" sldId="256"/>
+            <ac:spMk id="13" creationId="{B45AD435-D913-48D7-82DA-1CC7706F7753}"/>
+          </ac:spMkLst>
+        </pc:spChg>
+        <pc:spChg chg="mod">
+          <ac:chgData name="Drikus Dreyer" userId="2b911c4b7b469c0c" providerId="LiveId" clId="{66E06D5C-8E42-4D10-8A8E-9B7938918F0C}" dt="2019-11-27T23:14:11.260" v="4" actId="1076"/>
+          <ac:spMkLst>
+            <pc:docMk/>
+            <pc:sldMk cId="1003307221" sldId="256"/>
+            <ac:spMk id="14" creationId="{D61DD506-D73F-4D71-8AE8-4933C1292379}"/>
+          </ac:spMkLst>
+        </pc:spChg>
+        <pc:spChg chg="mod">
+          <ac:chgData name="Drikus Dreyer" userId="2b911c4b7b469c0c" providerId="LiveId" clId="{66E06D5C-8E42-4D10-8A8E-9B7938918F0C}" dt="2019-11-27T23:13:40.287" v="1" actId="1076"/>
+          <ac:spMkLst>
+            <pc:docMk/>
+            <pc:sldMk cId="1003307221" sldId="256"/>
+            <ac:spMk id="15" creationId="{256D40DB-8B0C-4595-BA7A-9F82604E937A}"/>
+          </ac:spMkLst>
+        </pc:spChg>
+        <pc:spChg chg="mod">
+          <ac:chgData name="Drikus Dreyer" userId="2b911c4b7b469c0c" providerId="LiveId" clId="{66E06D5C-8E42-4D10-8A8E-9B7938918F0C}" dt="2019-11-27T23:33:12.423" v="239" actId="14100"/>
+          <ac:spMkLst>
+            <pc:docMk/>
+            <pc:sldMk cId="1003307221" sldId="256"/>
+            <ac:spMk id="17" creationId="{D4D26D37-1999-4DAB-8444-CE01A9F928CE}"/>
+          </ac:spMkLst>
+        </pc:spChg>
+        <pc:spChg chg="mod">
+          <ac:chgData name="Drikus Dreyer" userId="2b911c4b7b469c0c" providerId="LiveId" clId="{66E06D5C-8E42-4D10-8A8E-9B7938918F0C}" dt="2019-11-27T23:14:11.260" v="4" actId="1076"/>
+          <ac:spMkLst>
+            <pc:docMk/>
+            <pc:sldMk cId="1003307221" sldId="256"/>
+            <ac:spMk id="18" creationId="{F842E58A-FF2B-4857-BDFF-857848C6DF07}"/>
+          </ac:spMkLst>
+        </pc:spChg>
+        <pc:spChg chg="mod">
+          <ac:chgData name="Drikus Dreyer" userId="2b911c4b7b469c0c" providerId="LiveId" clId="{66E06D5C-8E42-4D10-8A8E-9B7938918F0C}" dt="2019-11-27T23:23:02.603" v="75" actId="1076"/>
+          <ac:spMkLst>
+            <pc:docMk/>
+            <pc:sldMk cId="1003307221" sldId="256"/>
+            <ac:spMk id="19" creationId="{409B26F5-2FBD-411A-9821-EE91C81408E1}"/>
+          </ac:spMkLst>
+        </pc:spChg>
+        <pc:spChg chg="mod">
+          <ac:chgData name="Drikus Dreyer" userId="2b911c4b7b469c0c" providerId="LiveId" clId="{66E06D5C-8E42-4D10-8A8E-9B7938918F0C}" dt="2019-11-27T23:30:58.016" v="164" actId="20577"/>
+          <ac:spMkLst>
+            <pc:docMk/>
+            <pc:sldMk cId="1003307221" sldId="256"/>
+            <ac:spMk id="20" creationId="{DD72E6D3-35F5-4E75-A563-538F8CF3DB21}"/>
+          </ac:spMkLst>
+        </pc:spChg>
+        <pc:spChg chg="mod">
+          <ac:chgData name="Drikus Dreyer" userId="2b911c4b7b469c0c" providerId="LiveId" clId="{66E06D5C-8E42-4D10-8A8E-9B7938918F0C}" dt="2019-11-27T23:22:53.646" v="73" actId="207"/>
+          <ac:spMkLst>
+            <pc:docMk/>
+            <pc:sldMk cId="1003307221" sldId="256"/>
+            <ac:spMk id="21" creationId="{F37C51DA-61E2-4C15-B094-6FC9D6F365A5}"/>
+          </ac:spMkLst>
+        </pc:spChg>
+        <pc:spChg chg="mod">
+          <ac:chgData name="Drikus Dreyer" userId="2b911c4b7b469c0c" providerId="LiveId" clId="{66E06D5C-8E42-4D10-8A8E-9B7938918F0C}" dt="2019-11-27T23:23:13.209" v="77" actId="1076"/>
+          <ac:spMkLst>
+            <pc:docMk/>
+            <pc:sldMk cId="1003307221" sldId="256"/>
+            <ac:spMk id="24" creationId="{F76F0EE2-8009-4433-9CEA-FCF8820BE42E}"/>
+          </ac:spMkLst>
+        </pc:spChg>
+        <pc:spChg chg="mod">
+          <ac:chgData name="Drikus Dreyer" userId="2b911c4b7b469c0c" providerId="LiveId" clId="{66E06D5C-8E42-4D10-8A8E-9B7938918F0C}" dt="2019-11-27T23:24:14.845" v="104" actId="1076"/>
+          <ac:spMkLst>
+            <pc:docMk/>
+            <pc:sldMk cId="1003307221" sldId="256"/>
+            <ac:spMk id="27" creationId="{72C4AFC2-72F7-4E86-9CEB-05E83D7E9FEE}"/>
+          </ac:spMkLst>
+        </pc:spChg>
+        <pc:spChg chg="mod">
+          <ac:chgData name="Drikus Dreyer" userId="2b911c4b7b469c0c" providerId="LiveId" clId="{66E06D5C-8E42-4D10-8A8E-9B7938918F0C}" dt="2019-11-27T23:30:03.315" v="121" actId="1076"/>
+          <ac:spMkLst>
+            <pc:docMk/>
+            <pc:sldMk cId="1003307221" sldId="256"/>
+            <ac:spMk id="28" creationId="{4816A669-A2BB-43F3-B568-8CE96373BA9B}"/>
+          </ac:spMkLst>
+        </pc:spChg>
+        <pc:spChg chg="add mod">
+          <ac:chgData name="Drikus Dreyer" userId="2b911c4b7b469c0c" providerId="LiveId" clId="{66E06D5C-8E42-4D10-8A8E-9B7938918F0C}" dt="2019-11-27T23:33:18.888" v="240" actId="14100"/>
+          <ac:spMkLst>
+            <pc:docMk/>
+            <pc:sldMk cId="1003307221" sldId="256"/>
+            <ac:spMk id="29" creationId="{37F14A70-6B34-4FDC-9FB1-3915B9C5BD47}"/>
+          </ac:spMkLst>
+        </pc:spChg>
+        <pc:spChg chg="mod">
+          <ac:chgData name="Drikus Dreyer" userId="2b911c4b7b469c0c" providerId="LiveId" clId="{66E06D5C-8E42-4D10-8A8E-9B7938918F0C}" dt="2019-11-27T23:23:33.481" v="81" actId="20577"/>
+          <ac:spMkLst>
+            <pc:docMk/>
+            <pc:sldMk cId="1003307221" sldId="256"/>
+            <ac:spMk id="31" creationId="{AC9061E3-F66D-497C-BD68-695FEFA176E8}"/>
+          </ac:spMkLst>
+        </pc:spChg>
+        <pc:spChg chg="add mod">
+          <ac:chgData name="Drikus Dreyer" userId="2b911c4b7b469c0c" providerId="LiveId" clId="{66E06D5C-8E42-4D10-8A8E-9B7938918F0C}" dt="2019-11-27T23:32:16.913" v="233" actId="207"/>
+          <ac:spMkLst>
+            <pc:docMk/>
+            <pc:sldMk cId="1003307221" sldId="256"/>
+            <ac:spMk id="32" creationId="{6C23F0B4-09AC-4EAF-8285-7AE5EF71FB47}"/>
+          </ac:spMkLst>
+        </pc:spChg>
+        <pc:spChg chg="add mod">
+          <ac:chgData name="Drikus Dreyer" userId="2b911c4b7b469c0c" providerId="LiveId" clId="{66E06D5C-8E42-4D10-8A8E-9B7938918F0C}" dt="2019-11-27T23:32:07.999" v="232" actId="207"/>
+          <ac:spMkLst>
+            <pc:docMk/>
+            <pc:sldMk cId="1003307221" sldId="256"/>
+            <ac:spMk id="34" creationId="{DF614A91-602A-4A1C-98C3-09A121AB760B}"/>
+          </ac:spMkLst>
+        </pc:spChg>
+        <pc:spChg chg="add mod">
+          <ac:chgData name="Drikus Dreyer" userId="2b911c4b7b469c0c" providerId="LiveId" clId="{66E06D5C-8E42-4D10-8A8E-9B7938918F0C}" dt="2019-11-27T23:32:02.728" v="231" actId="207"/>
+          <ac:spMkLst>
+            <pc:docMk/>
+            <pc:sldMk cId="1003307221" sldId="256"/>
+            <ac:spMk id="35" creationId="{CECE9315-E66C-4FB0-9544-C8AB01CD996F}"/>
+          </ac:spMkLst>
+        </pc:spChg>
+        <pc:spChg chg="add mod">
+          <ac:chgData name="Drikus Dreyer" userId="2b911c4b7b469c0c" providerId="LiveId" clId="{66E06D5C-8E42-4D10-8A8E-9B7938918F0C}" dt="2019-11-27T23:31:52.924" v="230" actId="20577"/>
+          <ac:spMkLst>
+            <pc:docMk/>
+            <pc:sldMk cId="1003307221" sldId="256"/>
+            <ac:spMk id="54" creationId="{CBB23B1D-84F7-4DCF-8A46-85E5C35D09A5}"/>
+          </ac:spMkLst>
+        </pc:spChg>
+        <pc:spChg chg="add del mod">
+          <ac:chgData name="Drikus Dreyer" userId="2b911c4b7b469c0c" providerId="LiveId" clId="{66E06D5C-8E42-4D10-8A8E-9B7938918F0C}" dt="2019-11-27T23:31:07.368" v="166" actId="478"/>
+          <ac:spMkLst>
+            <pc:docMk/>
+            <pc:sldMk cId="1003307221" sldId="256"/>
+            <ac:spMk id="59" creationId="{369304BF-DC46-4405-A0DE-63BAC8FEB7B8}"/>
+          </ac:spMkLst>
+        </pc:spChg>
+        <pc:spChg chg="add mod">
+          <ac:chgData name="Drikus Dreyer" userId="2b911c4b7b469c0c" providerId="LiveId" clId="{66E06D5C-8E42-4D10-8A8E-9B7938918F0C}" dt="2019-11-27T23:24:55.822" v="114" actId="20577"/>
+          <ac:spMkLst>
+            <pc:docMk/>
+            <pc:sldMk cId="1003307221" sldId="256"/>
+            <ac:spMk id="60" creationId="{80F804BE-B770-4CEA-B8B0-9EBA1B0AEBA4}"/>
+          </ac:spMkLst>
+        </pc:spChg>
+        <pc:spChg chg="add mod">
+          <ac:chgData name="Drikus Dreyer" userId="2b911c4b7b469c0c" providerId="LiveId" clId="{66E06D5C-8E42-4D10-8A8E-9B7938918F0C}" dt="2019-11-27T23:30:45.304" v="155" actId="20577"/>
+          <ac:spMkLst>
+            <pc:docMk/>
+            <pc:sldMk cId="1003307221" sldId="256"/>
+            <ac:spMk id="64" creationId="{29195666-7E21-457A-ABFE-97E71AE8746C}"/>
+          </ac:spMkLst>
+        </pc:spChg>
+        <pc:cxnChg chg="mod">
+          <ac:chgData name="Drikus Dreyer" userId="2b911c4b7b469c0c" providerId="LiveId" clId="{66E06D5C-8E42-4D10-8A8E-9B7938918F0C}" dt="2019-11-27T23:33:43.323" v="242" actId="14100"/>
+          <ac:cxnSpMkLst>
+            <pc:docMk/>
+            <pc:sldMk cId="1003307221" sldId="256"/>
+            <ac:cxnSpMk id="11" creationId="{D8C84068-B338-441E-915D-A9A59FE0A4FB}"/>
+          </ac:cxnSpMkLst>
+        </pc:cxnChg>
+        <pc:cxnChg chg="mod">
+          <ac:chgData name="Drikus Dreyer" userId="2b911c4b7b469c0c" providerId="LiveId" clId="{66E06D5C-8E42-4D10-8A8E-9B7938918F0C}" dt="2019-11-27T23:13:40.287" v="1" actId="1076"/>
+          <ac:cxnSpMkLst>
+            <pc:docMk/>
+            <pc:sldMk cId="1003307221" sldId="256"/>
+            <ac:cxnSpMk id="12" creationId="{0E1D73DF-A44E-4283-9999-0FBAC95F0368}"/>
+          </ac:cxnSpMkLst>
+        </pc:cxnChg>
+        <pc:cxnChg chg="mod">
+          <ac:chgData name="Drikus Dreyer" userId="2b911c4b7b469c0c" providerId="LiveId" clId="{66E06D5C-8E42-4D10-8A8E-9B7938918F0C}" dt="2019-11-27T23:13:40.287" v="1" actId="1076"/>
+          <ac:cxnSpMkLst>
+            <pc:docMk/>
+            <pc:sldMk cId="1003307221" sldId="256"/>
+            <ac:cxnSpMk id="16" creationId="{14B47F0C-0B62-4557-85D6-FE0CCEE91A2F}"/>
+          </ac:cxnSpMkLst>
+        </pc:cxnChg>
+        <pc:cxnChg chg="mod">
+          <ac:chgData name="Drikus Dreyer" userId="2b911c4b7b469c0c" providerId="LiveId" clId="{66E06D5C-8E42-4D10-8A8E-9B7938918F0C}" dt="2019-11-27T23:29:56.152" v="120" actId="14100"/>
+          <ac:cxnSpMkLst>
+            <pc:docMk/>
+            <pc:sldMk cId="1003307221" sldId="256"/>
+            <ac:cxnSpMk id="22" creationId="{343DA76F-0D66-495B-95A8-DEA52D35A935}"/>
+          </ac:cxnSpMkLst>
+        </pc:cxnChg>
+        <pc:cxnChg chg="mod">
+          <ac:chgData name="Drikus Dreyer" userId="2b911c4b7b469c0c" providerId="LiveId" clId="{66E06D5C-8E42-4D10-8A8E-9B7938918F0C}" dt="2019-11-27T23:32:50.325" v="236" actId="14100"/>
+          <ac:cxnSpMkLst>
+            <pc:docMk/>
+            <pc:sldMk cId="1003307221" sldId="256"/>
+            <ac:cxnSpMk id="23" creationId="{09F18F51-41DD-4B15-903E-CB79397F7BB0}"/>
+          </ac:cxnSpMkLst>
+        </pc:cxnChg>
+        <pc:cxnChg chg="mod">
+          <ac:chgData name="Drikus Dreyer" userId="2b911c4b7b469c0c" providerId="LiveId" clId="{66E06D5C-8E42-4D10-8A8E-9B7938918F0C}" dt="2019-11-27T23:23:13.209" v="77" actId="1076"/>
+          <ac:cxnSpMkLst>
+            <pc:docMk/>
+            <pc:sldMk cId="1003307221" sldId="256"/>
+            <ac:cxnSpMk id="25" creationId="{F9D15AB5-E3F9-490D-A35A-10EB4C917DCD}"/>
+          </ac:cxnSpMkLst>
+        </pc:cxnChg>
+        <pc:cxnChg chg="mod">
+          <ac:chgData name="Drikus Dreyer" userId="2b911c4b7b469c0c" providerId="LiveId" clId="{66E06D5C-8E42-4D10-8A8E-9B7938918F0C}" dt="2019-11-27T23:30:15.746" v="125" actId="14100"/>
+          <ac:cxnSpMkLst>
+            <pc:docMk/>
+            <pc:sldMk cId="1003307221" sldId="256"/>
+            <ac:cxnSpMk id="30" creationId="{157C6546-ACE3-49D5-933B-FF191C7865FC}"/>
+          </ac:cxnSpMkLst>
+        </pc:cxnChg>
+        <pc:cxnChg chg="mod">
+          <ac:chgData name="Drikus Dreyer" userId="2b911c4b7b469c0c" providerId="LiveId" clId="{66E06D5C-8E42-4D10-8A8E-9B7938918F0C}" dt="2019-11-27T23:23:33.481" v="81" actId="20577"/>
+          <ac:cxnSpMkLst>
+            <pc:docMk/>
+            <pc:sldMk cId="1003307221" sldId="256"/>
+            <ac:cxnSpMk id="33" creationId="{5E1E37BF-75A2-4AF4-A482-B7D3F5D04B38}"/>
+          </ac:cxnSpMkLst>
+        </pc:cxnChg>
+        <pc:cxnChg chg="add mod">
+          <ac:chgData name="Drikus Dreyer" userId="2b911c4b7b469c0c" providerId="LiveId" clId="{66E06D5C-8E42-4D10-8A8E-9B7938918F0C}" dt="2019-11-27T23:18:59.079" v="37" actId="14100"/>
+          <ac:cxnSpMkLst>
+            <pc:docMk/>
+            <pc:sldMk cId="1003307221" sldId="256"/>
+            <ac:cxnSpMk id="36" creationId="{27A6128C-C8C6-4498-99D9-7FDDC05226E2}"/>
+          </ac:cxnSpMkLst>
+        </pc:cxnChg>
+        <pc:cxnChg chg="add mod">
+          <ac:chgData name="Drikus Dreyer" userId="2b911c4b7b469c0c" providerId="LiveId" clId="{66E06D5C-8E42-4D10-8A8E-9B7938918F0C}" dt="2019-11-27T23:20:11.864" v="58" actId="1076"/>
+          <ac:cxnSpMkLst>
+            <pc:docMk/>
+            <pc:sldMk cId="1003307221" sldId="256"/>
+            <ac:cxnSpMk id="39" creationId="{1F5E94C9-2B32-4C07-8567-D153904F3688}"/>
+          </ac:cxnSpMkLst>
+        </pc:cxnChg>
+        <pc:cxnChg chg="add mod">
+          <ac:chgData name="Drikus Dreyer" userId="2b911c4b7b469c0c" providerId="LiveId" clId="{66E06D5C-8E42-4D10-8A8E-9B7938918F0C}" dt="2019-11-27T23:20:58.744" v="64" actId="1076"/>
+          <ac:cxnSpMkLst>
+            <pc:docMk/>
+            <pc:sldMk cId="1003307221" sldId="256"/>
+            <ac:cxnSpMk id="44" creationId="{9EF16D6C-B24F-45B7-AF62-28009F94091A}"/>
+          </ac:cxnSpMkLst>
+        </pc:cxnChg>
+        <pc:cxnChg chg="add mod">
+          <ac:chgData name="Drikus Dreyer" userId="2b911c4b7b469c0c" providerId="LiveId" clId="{66E06D5C-8E42-4D10-8A8E-9B7938918F0C}" dt="2019-11-27T23:21:10.214" v="67" actId="14100"/>
+          <ac:cxnSpMkLst>
+            <pc:docMk/>
+            <pc:sldMk cId="1003307221" sldId="256"/>
+            <ac:cxnSpMk id="48" creationId="{A7EDF8A3-9C2C-4AAF-8D1F-2F1BCF9AB21D}"/>
+          </ac:cxnSpMkLst>
+        </pc:cxnChg>
+        <pc:cxnChg chg="add mod">
+          <ac:chgData name="Drikus Dreyer" userId="2b911c4b7b469c0c" providerId="LiveId" clId="{66E06D5C-8E42-4D10-8A8E-9B7938918F0C}" dt="2019-11-27T23:21:21.152" v="70" actId="14100"/>
+          <ac:cxnSpMkLst>
+            <pc:docMk/>
+            <pc:sldMk cId="1003307221" sldId="256"/>
+            <ac:cxnSpMk id="51" creationId="{EF99D03B-D2FA-4A12-9A99-64D84401CAF1}"/>
+          </ac:cxnSpMkLst>
+        </pc:cxnChg>
+        <pc:cxnChg chg="add mod">
+          <ac:chgData name="Drikus Dreyer" userId="2b911c4b7b469c0c" providerId="LiveId" clId="{66E06D5C-8E42-4D10-8A8E-9B7938918F0C}" dt="2019-11-27T23:33:35.377" v="241" actId="14100"/>
+          <ac:cxnSpMkLst>
+            <pc:docMk/>
+            <pc:sldMk cId="1003307221" sldId="256"/>
+            <ac:cxnSpMk id="61" creationId="{C58100A8-8C70-46F5-AF6D-1651A9EAE1E1}"/>
+          </ac:cxnSpMkLst>
+        </pc:cxnChg>
+        <pc:cxnChg chg="add mod">
+          <ac:chgData name="Drikus Dreyer" userId="2b911c4b7b469c0c" providerId="LiveId" clId="{66E06D5C-8E42-4D10-8A8E-9B7938918F0C}" dt="2019-11-27T23:30:12.224" v="124" actId="14100"/>
+          <ac:cxnSpMkLst>
+            <pc:docMk/>
+            <pc:sldMk cId="1003307221" sldId="256"/>
+            <ac:cxnSpMk id="66" creationId="{04470AEC-63FE-4A04-B3DF-0264A96C8AE5}"/>
+          </ac:cxnSpMkLst>
+        </pc:cxnChg>
+      </pc:sldChg>
+    </pc:docChg>
+  </pc:docChgLst>
+  <pc:docChgLst>
+    <pc:chgData name="Drikus Dreyer" userId="2b911c4b7b469c0c" providerId="LiveId" clId="{0DD3C5B9-6664-49B6-8BA4-B3D15FACA8F0}"/>
+    <pc:docChg chg="custSel modSld">
+      <pc:chgData name="Drikus Dreyer" userId="2b911c4b7b469c0c" providerId="LiveId" clId="{0DD3C5B9-6664-49B6-8BA4-B3D15FACA8F0}" dt="2019-11-29T00:24:09.779" v="449" actId="20577"/>
+      <pc:docMkLst>
+        <pc:docMk/>
+      </pc:docMkLst>
+      <pc:sldChg chg="addSp delSp modSp">
+        <pc:chgData name="Drikus Dreyer" userId="2b911c4b7b469c0c" providerId="LiveId" clId="{0DD3C5B9-6664-49B6-8BA4-B3D15FACA8F0}" dt="2019-11-29T00:24:09.779" v="449" actId="20577"/>
+        <pc:sldMkLst>
+          <pc:docMk/>
+          <pc:sldMk cId="1003307221" sldId="256"/>
+        </pc:sldMkLst>
+        <pc:spChg chg="mod">
+          <ac:chgData name="Drikus Dreyer" userId="2b911c4b7b469c0c" providerId="LiveId" clId="{0DD3C5B9-6664-49B6-8BA4-B3D15FACA8F0}" dt="2019-11-29T00:21:24.128" v="371" actId="14100"/>
+          <ac:spMkLst>
+            <pc:docMk/>
+            <pc:sldMk cId="1003307221" sldId="256"/>
+            <ac:spMk id="7" creationId="{51F95D80-FAE9-4D77-B52D-041338080F20}"/>
+          </ac:spMkLst>
+        </pc:spChg>
+        <pc:spChg chg="mod">
+          <ac:chgData name="Drikus Dreyer" userId="2b911c4b7b469c0c" providerId="LiveId" clId="{0DD3C5B9-6664-49B6-8BA4-B3D15FACA8F0}" dt="2019-11-29T00:21:38.188" v="374" actId="14100"/>
+          <ac:spMkLst>
+            <pc:docMk/>
+            <pc:sldMk cId="1003307221" sldId="256"/>
+            <ac:spMk id="8" creationId="{D80EBE1C-A20F-494E-86D6-AA10922F1ED8}"/>
+          </ac:spMkLst>
+        </pc:spChg>
         <pc:spChg chg="add mod">
           <ac:chgData name="Drikus Dreyer" userId="2b911c4b7b469c0c" providerId="LiveId" clId="{0DD3C5B9-6664-49B6-8BA4-B3D15FACA8F0}" dt="2019-11-27T22:57:52.024" v="37" actId="1076"/>
           <ac:spMkLst>
@@ -151,6 +495,14 @@
             <ac:spMk id="14" creationId="{D61DD506-D73F-4D71-8AE8-4933C1292379}"/>
           </ac:spMkLst>
         </pc:spChg>
+        <pc:spChg chg="mod">
+          <ac:chgData name="Drikus Dreyer" userId="2b911c4b7b469c0c" providerId="LiveId" clId="{0DD3C5B9-6664-49B6-8BA4-B3D15FACA8F0}" dt="2019-11-29T00:21:56.345" v="379" actId="14100"/>
+          <ac:spMkLst>
+            <pc:docMk/>
+            <pc:sldMk cId="1003307221" sldId="256"/>
+            <ac:spMk id="15" creationId="{256D40DB-8B0C-4595-BA7A-9F82604E937A}"/>
+          </ac:spMkLst>
+        </pc:spChg>
         <pc:spChg chg="add mod">
           <ac:chgData name="Drikus Dreyer" userId="2b911c4b7b469c0c" providerId="LiveId" clId="{0DD3C5B9-6664-49B6-8BA4-B3D15FACA8F0}" dt="2019-11-27T22:57:22.485" v="35" actId="1076"/>
           <ac:spMkLst>
@@ -160,7 +512,7 @@
           </ac:spMkLst>
         </pc:spChg>
         <pc:spChg chg="add mod">
-          <ac:chgData name="Drikus Dreyer" userId="2b911c4b7b469c0c" providerId="LiveId" clId="{0DD3C5B9-6664-49B6-8BA4-B3D15FACA8F0}" dt="2019-11-28T19:58:29.101" v="371" actId="20577"/>
+          <ac:chgData name="Drikus Dreyer" userId="2b911c4b7b469c0c" providerId="LiveId" clId="{0DD3C5B9-6664-49B6-8BA4-B3D15FACA8F0}" dt="2019-11-27T22:59:47.392" v="103" actId="1076"/>
           <ac:spMkLst>
             <pc:docMk/>
             <pc:sldMk cId="1003307221" sldId="256"/>
@@ -199,12 +551,44 @@
             <ac:spMk id="31" creationId="{AC9061E3-F66D-497C-BD68-695FEFA176E8}"/>
           </ac:spMkLst>
         </pc:spChg>
+        <pc:spChg chg="mod">
+          <ac:chgData name="Drikus Dreyer" userId="2b911c4b7b469c0c" providerId="LiveId" clId="{0DD3C5B9-6664-49B6-8BA4-B3D15FACA8F0}" dt="2019-11-29T00:23:48.870" v="422" actId="1037"/>
+          <ac:spMkLst>
+            <pc:docMk/>
+            <pc:sldMk cId="1003307221" sldId="256"/>
+            <ac:spMk id="32" creationId="{6C23F0B4-09AC-4EAF-8285-7AE5EF71FB47}"/>
+          </ac:spMkLst>
+        </pc:spChg>
+        <pc:spChg chg="add mod">
+          <ac:chgData name="Drikus Dreyer" userId="2b911c4b7b469c0c" providerId="LiveId" clId="{0DD3C5B9-6664-49B6-8BA4-B3D15FACA8F0}" dt="2019-11-29T00:24:09.779" v="449" actId="20577"/>
+          <ac:spMkLst>
+            <pc:docMk/>
+            <pc:sldMk cId="1003307221" sldId="256"/>
+            <ac:spMk id="57" creationId="{02934A7A-3104-4724-BBD3-5819A2E4CD35}"/>
+          </ac:spMkLst>
+        </pc:spChg>
         <pc:cxnChg chg="add mod">
           <ac:chgData name="Drikus Dreyer" userId="2b911c4b7b469c0c" providerId="LiveId" clId="{0DD3C5B9-6664-49B6-8BA4-B3D15FACA8F0}" dt="2019-11-27T23:07:42.767" v="256" actId="255"/>
           <ac:cxnSpMkLst>
             <pc:docMk/>
             <pc:sldMk cId="1003307221" sldId="256"/>
             <ac:cxnSpMk id="11" creationId="{D8C84068-B338-441E-915D-A9A59FE0A4FB}"/>
+          </ac:cxnSpMkLst>
+        </pc:cxnChg>
+        <pc:cxnChg chg="mod">
+          <ac:chgData name="Drikus Dreyer" userId="2b911c4b7b469c0c" providerId="LiveId" clId="{0DD3C5B9-6664-49B6-8BA4-B3D15FACA8F0}" dt="2019-11-29T00:22:07.448" v="380" actId="14100"/>
+          <ac:cxnSpMkLst>
+            <pc:docMk/>
+            <pc:sldMk cId="1003307221" sldId="256"/>
+            <ac:cxnSpMk id="12" creationId="{0E1D73DF-A44E-4283-9999-0FBAC95F0368}"/>
+          </ac:cxnSpMkLst>
+        </pc:cxnChg>
+        <pc:cxnChg chg="mod">
+          <ac:chgData name="Drikus Dreyer" userId="2b911c4b7b469c0c" providerId="LiveId" clId="{0DD3C5B9-6664-49B6-8BA4-B3D15FACA8F0}" dt="2019-11-29T00:21:56.345" v="379" actId="14100"/>
+          <ac:cxnSpMkLst>
+            <pc:docMk/>
+            <pc:sldMk cId="1003307221" sldId="256"/>
+            <ac:cxnSpMk id="16" creationId="{14B47F0C-0B62-4557-85D6-FE0CCEE91A2F}"/>
           </ac:cxnSpMkLst>
         </pc:cxnChg>
         <pc:cxnChg chg="add mod">
@@ -213,6 +597,14 @@
             <pc:docMk/>
             <pc:sldMk cId="1003307221" sldId="256"/>
             <ac:cxnSpMk id="22" creationId="{343DA76F-0D66-495B-95A8-DEA52D35A935}"/>
+          </ac:cxnSpMkLst>
+        </pc:cxnChg>
+        <pc:cxnChg chg="mod">
+          <ac:chgData name="Drikus Dreyer" userId="2b911c4b7b469c0c" providerId="LiveId" clId="{0DD3C5B9-6664-49B6-8BA4-B3D15FACA8F0}" dt="2019-11-29T00:21:56.345" v="379" actId="14100"/>
+          <ac:cxnSpMkLst>
+            <pc:docMk/>
+            <pc:sldMk cId="1003307221" sldId="256"/>
+            <ac:cxnSpMk id="23" creationId="{09F18F51-41DD-4B15-903E-CB79397F7BB0}"/>
           </ac:cxnSpMkLst>
         </pc:cxnChg>
         <pc:cxnChg chg="add mod">
@@ -245,6 +637,38 @@
             <pc:docMk/>
             <pc:sldMk cId="1003307221" sldId="256"/>
             <ac:cxnSpMk id="33" creationId="{5E1E37BF-75A2-4AF4-A482-B7D3F5D04B38}"/>
+          </ac:cxnSpMkLst>
+        </pc:cxnChg>
+        <pc:cxnChg chg="mod">
+          <ac:chgData name="Drikus Dreyer" userId="2b911c4b7b469c0c" providerId="LiveId" clId="{0DD3C5B9-6664-49B6-8BA4-B3D15FACA8F0}" dt="2019-11-29T00:21:56.345" v="379" actId="14100"/>
+          <ac:cxnSpMkLst>
+            <pc:docMk/>
+            <pc:sldMk cId="1003307221" sldId="256"/>
+            <ac:cxnSpMk id="36" creationId="{27A6128C-C8C6-4498-99D9-7FDDC05226E2}"/>
+          </ac:cxnSpMkLst>
+        </pc:cxnChg>
+        <pc:cxnChg chg="mod">
+          <ac:chgData name="Drikus Dreyer" userId="2b911c4b7b469c0c" providerId="LiveId" clId="{0DD3C5B9-6664-49B6-8BA4-B3D15FACA8F0}" dt="2019-11-29T00:23:48.870" v="422" actId="1037"/>
+          <ac:cxnSpMkLst>
+            <pc:docMk/>
+            <pc:sldMk cId="1003307221" sldId="256"/>
+            <ac:cxnSpMk id="39" creationId="{1F5E94C9-2B32-4C07-8567-D153904F3688}"/>
+          </ac:cxnSpMkLst>
+        </pc:cxnChg>
+        <pc:cxnChg chg="mod">
+          <ac:chgData name="Drikus Dreyer" userId="2b911c4b7b469c0c" providerId="LiveId" clId="{0DD3C5B9-6664-49B6-8BA4-B3D15FACA8F0}" dt="2019-11-29T00:23:48.870" v="422" actId="1037"/>
+          <ac:cxnSpMkLst>
+            <pc:docMk/>
+            <pc:sldMk cId="1003307221" sldId="256"/>
+            <ac:cxnSpMk id="51" creationId="{EF99D03B-D2FA-4A12-9A99-64D84401CAF1}"/>
+          </ac:cxnSpMkLst>
+        </pc:cxnChg>
+        <pc:cxnChg chg="add mod">
+          <ac:chgData name="Drikus Dreyer" userId="2b911c4b7b469c0c" providerId="LiveId" clId="{0DD3C5B9-6664-49B6-8BA4-B3D15FACA8F0}" dt="2019-11-29T00:23:36.741" v="421" actId="14100"/>
+          <ac:cxnSpMkLst>
+            <pc:docMk/>
+            <pc:sldMk cId="1003307221" sldId="256"/>
+            <ac:cxnSpMk id="58" creationId="{E7F39E0A-44FF-437C-AD5A-D8AC5D8DE392}"/>
           </ac:cxnSpMkLst>
         </pc:cxnChg>
       </pc:sldChg>
@@ -3502,8 +3926,8 @@
         </p:nvSpPr>
         <p:spPr>
           <a:xfrm>
-            <a:off x="543464" y="671944"/>
-            <a:ext cx="3243532" cy="5849626"/>
+            <a:off x="138542" y="671944"/>
+            <a:ext cx="2369489" cy="5849626"/>
           </a:xfrm>
           <a:prstGeom prst="rect">
             <a:avLst/>
@@ -3552,8 +3976,8 @@
         </p:nvSpPr>
         <p:spPr>
           <a:xfrm>
-            <a:off x="1473602" y="733245"/>
-            <a:ext cx="1458541" cy="369332"/>
+            <a:off x="128184" y="763639"/>
+            <a:ext cx="2434769" cy="369332"/>
           </a:xfrm>
           <a:prstGeom prst="rect">
             <a:avLst/>
@@ -3568,7 +3992,7 @@
           <a:p>
             <a:r>
               <a:rPr lang="en-AU" dirty="0"/>
-              <a:t>Assessment 3</a:t>
+              <a:t>Enhanced Assessment 3</a:t>
             </a:r>
           </a:p>
         </p:txBody>
@@ -3587,8 +4011,8 @@
         </p:nvSpPr>
         <p:spPr>
           <a:xfrm>
-            <a:off x="1172434" y="1242204"/>
-            <a:ext cx="2060875" cy="1725283"/>
+            <a:off x="347895" y="1231906"/>
+            <a:ext cx="2060874" cy="802776"/>
           </a:xfrm>
           <a:prstGeom prst="flowChartMultidocument">
             <a:avLst/>
@@ -3636,8 +4060,8 @@
         </p:nvSpPr>
         <p:spPr>
           <a:xfrm>
-            <a:off x="1172434" y="3429000"/>
-            <a:ext cx="2060875" cy="1117121"/>
+            <a:off x="347891" y="2535820"/>
+            <a:ext cx="2060875" cy="452467"/>
           </a:xfrm>
           <a:prstGeom prst="flowChartProcess">
             <a:avLst/>
@@ -3688,8 +4112,8 @@
         </p:nvCxnSpPr>
         <p:spPr>
           <a:xfrm flipV="1">
-            <a:off x="2202872" y="2827860"/>
-            <a:ext cx="0" cy="601140"/>
+            <a:off x="1378329" y="2034682"/>
+            <a:ext cx="0" cy="501138"/>
           </a:xfrm>
           <a:prstGeom prst="straightConnector1">
             <a:avLst/>
@@ -3728,8 +4152,8 @@
         </p:nvSpPr>
         <p:spPr>
           <a:xfrm>
-            <a:off x="1353966" y="5147261"/>
-            <a:ext cx="1697807" cy="1117121"/>
+            <a:off x="518133" y="3467236"/>
+            <a:ext cx="1697807" cy="731140"/>
           </a:xfrm>
           <a:prstGeom prst="flowChartDocument">
             <a:avLst/>
@@ -3774,13 +4198,15 @@
           </p:cNvPr>
           <p:cNvCxnSpPr>
             <a:cxnSpLocks/>
+            <a:stCxn id="15" idx="0"/>
+            <a:endCxn id="8" idx="2"/>
           </p:cNvCxnSpPr>
           <p:nvPr/>
         </p:nvCxnSpPr>
         <p:spPr>
           <a:xfrm flipV="1">
-            <a:off x="2202870" y="4546121"/>
-            <a:ext cx="0" cy="601140"/>
+            <a:off x="1367037" y="2988287"/>
+            <a:ext cx="11292" cy="478949"/>
           </a:xfrm>
           <a:prstGeom prst="straightConnector1">
             <a:avLst/>
@@ -3819,8 +4245,8 @@
         </p:nvSpPr>
         <p:spPr>
           <a:xfrm>
-            <a:off x="4263745" y="671944"/>
-            <a:ext cx="7606202" cy="5849626"/>
+            <a:off x="5724681" y="671944"/>
+            <a:ext cx="6295751" cy="5849626"/>
           </a:xfrm>
           <a:prstGeom prst="rect">
             <a:avLst/>
@@ -3870,7 +4296,7 @@
         <p:spPr>
           <a:xfrm>
             <a:off x="7483338" y="750498"/>
-            <a:ext cx="1458541" cy="369332"/>
+            <a:ext cx="2434769" cy="369332"/>
           </a:xfrm>
           <a:prstGeom prst="rect">
             <a:avLst/>
@@ -3885,7 +4311,7 @@
           <a:p>
             <a:r>
               <a:rPr lang="en-AU" dirty="0"/>
-              <a:t>Assessment 4</a:t>
+              <a:t>Enhanced Assessment 4</a:t>
             </a:r>
           </a:p>
         </p:txBody>
@@ -3904,12 +4330,17 @@
         </p:nvSpPr>
         <p:spPr>
           <a:xfrm>
-            <a:off x="5006688" y="3428999"/>
+            <a:off x="6067188" y="3639814"/>
             <a:ext cx="2060875" cy="1117121"/>
           </a:xfrm>
           <a:prstGeom prst="flowChartProcess">
             <a:avLst/>
           </a:prstGeom>
+          <a:solidFill>
+            <a:schemeClr val="accent2">
+              <a:lumMod val="75000"/>
+            </a:schemeClr>
+          </a:solidFill>
         </p:spPr>
         <p:style>
           <a:lnRef idx="2">
@@ -3934,7 +4365,7 @@
             <a:pPr algn="ctr"/>
             <a:r>
               <a:rPr lang="en-AU" dirty="0"/>
-              <a:t>Spark Session</a:t>
+              <a:t>Spark Streaming</a:t>
             </a:r>
           </a:p>
         </p:txBody>
@@ -3949,221 +4380,16 @@
             </a:extLst>
           </p:cNvPr>
           <p:cNvCxnSpPr>
+            <a:cxnSpLocks/>
             <a:stCxn id="15" idx="3"/>
-            <a:endCxn id="21" idx="1"/>
+            <a:endCxn id="35" idx="1"/>
           </p:cNvCxnSpPr>
           <p:nvPr/>
         </p:nvCxnSpPr>
         <p:spPr>
           <a:xfrm flipV="1">
-            <a:off x="3051773" y="3987560"/>
-            <a:ext cx="1954915" cy="1718262"/>
-          </a:xfrm>
-          <a:prstGeom prst="bentConnector3">
-            <a:avLst/>
-          </a:prstGeom>
-          <a:ln w="73025">
-            <a:solidFill>
-              <a:schemeClr val="accent2"/>
-            </a:solidFill>
-            <a:tailEnd type="triangle"/>
-          </a:ln>
-        </p:spPr>
-        <p:style>
-          <a:lnRef idx="1">
-            <a:schemeClr val="accent1"/>
-          </a:lnRef>
-          <a:fillRef idx="0">
-            <a:schemeClr val="accent1"/>
-          </a:fillRef>
-          <a:effectRef idx="0">
-            <a:schemeClr val="accent1"/>
-          </a:effectRef>
-          <a:fontRef idx="minor">
-            <a:schemeClr val="tx1"/>
-          </a:fontRef>
-        </p:style>
-      </p:cxnSp>
-      <p:sp>
-        <p:nvSpPr>
-          <p:cNvPr id="13" name="TextBox 12">
-            <a:extLst>
-              <a:ext uri="{FF2B5EF4-FFF2-40B4-BE49-F238E27FC236}">
-                <a16:creationId xmlns:a16="http://schemas.microsoft.com/office/drawing/2014/main" id="{B45AD435-D913-48D7-82DA-1CC7706F7753}"/>
-              </a:ext>
-            </a:extLst>
-          </p:cNvPr>
-          <p:cNvSpPr txBox="1"/>
-          <p:nvPr/>
-        </p:nvSpPr>
-        <p:spPr>
-          <a:xfrm>
-            <a:off x="4934630" y="2595721"/>
-            <a:ext cx="859081" cy="369332"/>
-          </a:xfrm>
-          <a:prstGeom prst="rect">
-            <a:avLst/>
-          </a:prstGeom>
-          <a:noFill/>
-        </p:spPr>
-        <p:txBody>
-          <a:bodyPr wrap="none" rtlCol="0">
-            <a:spAutoFit/>
-          </a:bodyPr>
-          <a:lstStyle/>
-          <a:p>
-            <a:r>
-              <a:rPr lang="en-AU" dirty="0"/>
-              <a:t>Format</a:t>
-            </a:r>
-          </a:p>
-        </p:txBody>
-      </p:sp>
-      <p:sp>
-        <p:nvSpPr>
-          <p:cNvPr id="14" name="TextBox 13">
-            <a:extLst>
-              <a:ext uri="{FF2B5EF4-FFF2-40B4-BE49-F238E27FC236}">
-                <a16:creationId xmlns:a16="http://schemas.microsoft.com/office/drawing/2014/main" id="{D61DD506-D73F-4D71-8AE8-4933C1292379}"/>
-              </a:ext>
-            </a:extLst>
-          </p:cNvPr>
-          <p:cNvSpPr txBox="1"/>
-          <p:nvPr/>
-        </p:nvSpPr>
-        <p:spPr>
-          <a:xfrm>
-            <a:off x="4935206" y="2858959"/>
-            <a:ext cx="920445" cy="369332"/>
-          </a:xfrm>
-          <a:prstGeom prst="rect">
-            <a:avLst/>
-          </a:prstGeom>
-          <a:noFill/>
-        </p:spPr>
-        <p:txBody>
-          <a:bodyPr wrap="none" rtlCol="0">
-            <a:spAutoFit/>
-          </a:bodyPr>
-          <a:lstStyle/>
-          <a:p>
-            <a:r>
-              <a:rPr lang="en-AU" dirty="0"/>
-              <a:t>Schema</a:t>
-            </a:r>
-          </a:p>
-        </p:txBody>
-      </p:sp>
-      <p:sp>
-        <p:nvSpPr>
-          <p:cNvPr id="18" name="TextBox 17">
-            <a:extLst>
-              <a:ext uri="{FF2B5EF4-FFF2-40B4-BE49-F238E27FC236}">
-                <a16:creationId xmlns:a16="http://schemas.microsoft.com/office/drawing/2014/main" id="{F842E58A-FF2B-4857-BDFF-857848C6DF07}"/>
-              </a:ext>
-            </a:extLst>
-          </p:cNvPr>
-          <p:cNvSpPr txBox="1"/>
-          <p:nvPr/>
-        </p:nvSpPr>
-        <p:spPr>
-          <a:xfrm>
-            <a:off x="4934630" y="3091752"/>
-            <a:ext cx="921021" cy="369332"/>
-          </a:xfrm>
-          <a:prstGeom prst="rect">
-            <a:avLst/>
-          </a:prstGeom>
-          <a:noFill/>
-        </p:spPr>
-        <p:txBody>
-          <a:bodyPr wrap="none" rtlCol="0">
-            <a:spAutoFit/>
-          </a:bodyPr>
-          <a:lstStyle/>
-          <a:p>
-            <a:r>
-              <a:rPr lang="en-AU" dirty="0"/>
-              <a:t>Options</a:t>
-            </a:r>
-          </a:p>
-        </p:txBody>
-      </p:sp>
-      <p:sp>
-        <p:nvSpPr>
-          <p:cNvPr id="19" name="Flowchart: Process 18">
-            <a:extLst>
-              <a:ext uri="{FF2B5EF4-FFF2-40B4-BE49-F238E27FC236}">
-                <a16:creationId xmlns:a16="http://schemas.microsoft.com/office/drawing/2014/main" id="{409B26F5-2FBD-411A-9821-EE91C81408E1}"/>
-              </a:ext>
-            </a:extLst>
-          </p:cNvPr>
-          <p:cNvSpPr/>
-          <p:nvPr/>
-        </p:nvSpPr>
-        <p:spPr>
-          <a:xfrm>
-            <a:off x="8297645" y="2269299"/>
-            <a:ext cx="2060875" cy="1117121"/>
-          </a:xfrm>
-          <a:prstGeom prst="flowChartProcess">
-            <a:avLst/>
-          </a:prstGeom>
-        </p:spPr>
-        <p:style>
-          <a:lnRef idx="2">
-            <a:schemeClr val="accent1">
-              <a:shade val="50000"/>
-            </a:schemeClr>
-          </a:lnRef>
-          <a:fillRef idx="1">
-            <a:schemeClr val="accent1"/>
-          </a:fillRef>
-          <a:effectRef idx="0">
-            <a:schemeClr val="accent1"/>
-          </a:effectRef>
-          <a:fontRef idx="minor">
-            <a:schemeClr val="lt1"/>
-          </a:fontRef>
-        </p:style>
-        <p:txBody>
-          <a:bodyPr rtlCol="0" anchor="ctr"/>
-          <a:lstStyle/>
-          <a:p>
-            <a:pPr algn="ctr"/>
-            <a:r>
-              <a:rPr lang="en-AU" dirty="0"/>
-              <a:t>Applied NLP Techniques</a:t>
-            </a:r>
-          </a:p>
-          <a:p>
-            <a:pPr algn="ctr"/>
-            <a:r>
-              <a:rPr lang="en-AU" dirty="0"/>
-              <a:t>Refer (Fig. 3)</a:t>
-            </a:r>
-          </a:p>
-        </p:txBody>
-      </p:sp>
-      <p:cxnSp>
-        <p:nvCxnSpPr>
-          <p:cNvPr id="22" name="Connector: Elbow 21">
-            <a:extLst>
-              <a:ext uri="{FF2B5EF4-FFF2-40B4-BE49-F238E27FC236}">
-                <a16:creationId xmlns:a16="http://schemas.microsoft.com/office/drawing/2014/main" id="{343DA76F-0D66-495B-95A8-DEA52D35A935}"/>
-              </a:ext>
-            </a:extLst>
-          </p:cNvPr>
-          <p:cNvCxnSpPr>
-            <a:cxnSpLocks/>
-            <a:stCxn id="21" idx="3"/>
-          </p:cNvCxnSpPr>
-          <p:nvPr/>
-        </p:nvCxnSpPr>
-        <p:spPr>
-          <a:xfrm flipV="1">
-            <a:off x="7067563" y="2827860"/>
-            <a:ext cx="1224385" cy="1159700"/>
+            <a:off x="2215940" y="1674562"/>
+            <a:ext cx="894629" cy="2158244"/>
           </a:xfrm>
           <a:prstGeom prst="bentConnector3">
             <a:avLst>
@@ -4194,10 +4420,115 @@
       </p:cxnSp>
       <p:sp>
         <p:nvSpPr>
-          <p:cNvPr id="24" name="Flowchart: Process 23">
-            <a:extLst>
-              <a:ext uri="{FF2B5EF4-FFF2-40B4-BE49-F238E27FC236}">
-                <a16:creationId xmlns:a16="http://schemas.microsoft.com/office/drawing/2014/main" id="{F76F0EE2-8009-4433-9CEA-FCF8820BE42E}"/>
+          <p:cNvPr id="13" name="TextBox 12">
+            <a:extLst>
+              <a:ext uri="{FF2B5EF4-FFF2-40B4-BE49-F238E27FC236}">
+                <a16:creationId xmlns:a16="http://schemas.microsoft.com/office/drawing/2014/main" id="{B45AD435-D913-48D7-82DA-1CC7706F7753}"/>
+              </a:ext>
+            </a:extLst>
+          </p:cNvPr>
+          <p:cNvSpPr txBox="1"/>
+          <p:nvPr/>
+        </p:nvSpPr>
+        <p:spPr>
+          <a:xfrm>
+            <a:off x="6105339" y="2725049"/>
+            <a:ext cx="859081" cy="369332"/>
+          </a:xfrm>
+          <a:prstGeom prst="rect">
+            <a:avLst/>
+          </a:prstGeom>
+          <a:noFill/>
+        </p:spPr>
+        <p:txBody>
+          <a:bodyPr wrap="none" rtlCol="0">
+            <a:spAutoFit/>
+          </a:bodyPr>
+          <a:lstStyle/>
+          <a:p>
+            <a:r>
+              <a:rPr lang="en-AU" dirty="0"/>
+              <a:t>Format</a:t>
+            </a:r>
+          </a:p>
+        </p:txBody>
+      </p:sp>
+      <p:sp>
+        <p:nvSpPr>
+          <p:cNvPr id="14" name="TextBox 13">
+            <a:extLst>
+              <a:ext uri="{FF2B5EF4-FFF2-40B4-BE49-F238E27FC236}">
+                <a16:creationId xmlns:a16="http://schemas.microsoft.com/office/drawing/2014/main" id="{D61DD506-D73F-4D71-8AE8-4933C1292379}"/>
+              </a:ext>
+            </a:extLst>
+          </p:cNvPr>
+          <p:cNvSpPr txBox="1"/>
+          <p:nvPr/>
+        </p:nvSpPr>
+        <p:spPr>
+          <a:xfrm>
+            <a:off x="6105915" y="2988287"/>
+            <a:ext cx="920445" cy="369332"/>
+          </a:xfrm>
+          <a:prstGeom prst="rect">
+            <a:avLst/>
+          </a:prstGeom>
+          <a:noFill/>
+        </p:spPr>
+        <p:txBody>
+          <a:bodyPr wrap="none" rtlCol="0">
+            <a:spAutoFit/>
+          </a:bodyPr>
+          <a:lstStyle/>
+          <a:p>
+            <a:r>
+              <a:rPr lang="en-AU" dirty="0"/>
+              <a:t>Schema</a:t>
+            </a:r>
+          </a:p>
+        </p:txBody>
+      </p:sp>
+      <p:sp>
+        <p:nvSpPr>
+          <p:cNvPr id="18" name="TextBox 17">
+            <a:extLst>
+              <a:ext uri="{FF2B5EF4-FFF2-40B4-BE49-F238E27FC236}">
+                <a16:creationId xmlns:a16="http://schemas.microsoft.com/office/drawing/2014/main" id="{F842E58A-FF2B-4857-BDFF-857848C6DF07}"/>
+              </a:ext>
+            </a:extLst>
+          </p:cNvPr>
+          <p:cNvSpPr txBox="1"/>
+          <p:nvPr/>
+        </p:nvSpPr>
+        <p:spPr>
+          <a:xfrm>
+            <a:off x="6105339" y="3221080"/>
+            <a:ext cx="921021" cy="369332"/>
+          </a:xfrm>
+          <a:prstGeom prst="rect">
+            <a:avLst/>
+          </a:prstGeom>
+          <a:noFill/>
+        </p:spPr>
+        <p:txBody>
+          <a:bodyPr wrap="none" rtlCol="0">
+            <a:spAutoFit/>
+          </a:bodyPr>
+          <a:lstStyle/>
+          <a:p>
+            <a:r>
+              <a:rPr lang="en-AU" dirty="0"/>
+              <a:t>Options</a:t>
+            </a:r>
+          </a:p>
+        </p:txBody>
+      </p:sp>
+      <p:sp>
+        <p:nvSpPr>
+          <p:cNvPr id="19" name="Flowchart: Process 18">
+            <a:extLst>
+              <a:ext uri="{FF2B5EF4-FFF2-40B4-BE49-F238E27FC236}">
+                <a16:creationId xmlns:a16="http://schemas.microsoft.com/office/drawing/2014/main" id="{409B26F5-2FBD-411A-9821-EE91C81408E1}"/>
               </a:ext>
             </a:extLst>
           </p:cNvPr>
@@ -4206,7 +4537,7 @@
         </p:nvSpPr>
         <p:spPr>
           <a:xfrm>
-            <a:off x="8291948" y="4495343"/>
+            <a:off x="9204683" y="2398627"/>
             <a:ext cx="2060875" cy="1117121"/>
           </a:xfrm>
           <a:prstGeom prst="flowChartProcess">
@@ -4236,6 +4567,111 @@
             <a:pPr algn="ctr"/>
             <a:r>
               <a:rPr lang="en-AU" dirty="0"/>
+              <a:t>Applied NLP Techniques</a:t>
+            </a:r>
+          </a:p>
+          <a:p>
+            <a:pPr algn="ctr"/>
+            <a:r>
+              <a:rPr lang="en-AU" dirty="0"/>
+              <a:t>Refer (Fig.)</a:t>
+            </a:r>
+          </a:p>
+        </p:txBody>
+      </p:sp>
+      <p:cxnSp>
+        <p:nvCxnSpPr>
+          <p:cNvPr id="22" name="Connector: Elbow 21">
+            <a:extLst>
+              <a:ext uri="{FF2B5EF4-FFF2-40B4-BE49-F238E27FC236}">
+                <a16:creationId xmlns:a16="http://schemas.microsoft.com/office/drawing/2014/main" id="{343DA76F-0D66-495B-95A8-DEA52D35A935}"/>
+              </a:ext>
+            </a:extLst>
+          </p:cNvPr>
+          <p:cNvCxnSpPr>
+            <a:cxnSpLocks/>
+            <a:stCxn id="21" idx="3"/>
+            <a:endCxn id="64" idx="2"/>
+          </p:cNvCxnSpPr>
+          <p:nvPr/>
+        </p:nvCxnSpPr>
+        <p:spPr>
+          <a:xfrm flipH="1" flipV="1">
+            <a:off x="7856443" y="2311676"/>
+            <a:ext cx="271620" cy="1886699"/>
+          </a:xfrm>
+          <a:prstGeom prst="bentConnector4">
+            <a:avLst>
+              <a:gd name="adj1" fmla="val -84162"/>
+              <a:gd name="adj2" fmla="val 64803"/>
+            </a:avLst>
+          </a:prstGeom>
+          <a:ln w="73025">
+            <a:solidFill>
+              <a:schemeClr val="accent2"/>
+            </a:solidFill>
+            <a:tailEnd type="triangle"/>
+          </a:ln>
+        </p:spPr>
+        <p:style>
+          <a:lnRef idx="1">
+            <a:schemeClr val="accent1"/>
+          </a:lnRef>
+          <a:fillRef idx="0">
+            <a:schemeClr val="accent1"/>
+          </a:fillRef>
+          <a:effectRef idx="0">
+            <a:schemeClr val="accent1"/>
+          </a:effectRef>
+          <a:fontRef idx="minor">
+            <a:schemeClr val="tx1"/>
+          </a:fontRef>
+        </p:style>
+      </p:cxnSp>
+      <p:sp>
+        <p:nvSpPr>
+          <p:cNvPr id="24" name="Flowchart: Process 23">
+            <a:extLst>
+              <a:ext uri="{FF2B5EF4-FFF2-40B4-BE49-F238E27FC236}">
+                <a16:creationId xmlns:a16="http://schemas.microsoft.com/office/drawing/2014/main" id="{F76F0EE2-8009-4433-9CEA-FCF8820BE42E}"/>
+              </a:ext>
+            </a:extLst>
+          </p:cNvPr>
+          <p:cNvSpPr/>
+          <p:nvPr/>
+        </p:nvSpPr>
+        <p:spPr>
+          <a:xfrm>
+            <a:off x="9202103" y="4698856"/>
+            <a:ext cx="2060875" cy="1117121"/>
+          </a:xfrm>
+          <a:prstGeom prst="flowChartProcess">
+            <a:avLst/>
+          </a:prstGeom>
+        </p:spPr>
+        <p:style>
+          <a:lnRef idx="2">
+            <a:schemeClr val="accent1">
+              <a:shade val="50000"/>
+            </a:schemeClr>
+          </a:lnRef>
+          <a:fillRef idx="1">
+            <a:schemeClr val="accent1"/>
+          </a:fillRef>
+          <a:effectRef idx="0">
+            <a:schemeClr val="accent1"/>
+          </a:effectRef>
+          <a:fontRef idx="minor">
+            <a:schemeClr val="lt1"/>
+          </a:fontRef>
+        </p:style>
+        <p:txBody>
+          <a:bodyPr rtlCol="0" anchor="ctr"/>
+          <a:lstStyle/>
+          <a:p>
+            <a:pPr algn="ctr"/>
+            <a:r>
+              <a:rPr lang="en-AU" dirty="0"/>
               <a:t>Sentiment Analysis</a:t>
             </a:r>
           </a:p>
@@ -4273,14 +4709,15 @@
           </p:cNvPr>
           <p:cNvCxnSpPr>
             <a:cxnSpLocks/>
+            <a:stCxn id="19" idx="2"/>
             <a:endCxn id="24" idx="0"/>
           </p:cNvCxnSpPr>
           <p:nvPr/>
         </p:nvCxnSpPr>
         <p:spPr>
-          <a:xfrm rot="16200000" flipH="1">
-            <a:off x="8764883" y="3937840"/>
-            <a:ext cx="1115004" cy="1"/>
+          <a:xfrm rot="5400000">
+            <a:off x="9642277" y="4106012"/>
+            <a:ext cx="1183108" cy="2580"/>
           </a:xfrm>
           <a:prstGeom prst="bentConnector3">
             <a:avLst>
@@ -4323,8 +4760,8 @@
         </p:nvSpPr>
         <p:spPr>
           <a:xfrm>
-            <a:off x="4597498" y="5668470"/>
-            <a:ext cx="1829603" cy="523220"/>
+            <a:off x="6245483" y="5308714"/>
+            <a:ext cx="1525482" cy="523220"/>
           </a:xfrm>
           <a:prstGeom prst="rect">
             <a:avLst/>
@@ -4339,13 +4776,13 @@
           <a:p>
             <a:r>
               <a:rPr lang="en-AU" sz="1400" dirty="0"/>
-              <a:t>Data ingestion Framed</a:t>
+              <a:t>Data ingestion via </a:t>
             </a:r>
           </a:p>
           <a:p>
             <a:r>
               <a:rPr lang="en-AU" sz="1400" dirty="0"/>
-              <a:t>on Schema Format</a:t>
+              <a:t>published topics</a:t>
             </a:r>
           </a:p>
         </p:txBody>
@@ -4360,14 +4797,15 @@
             </a:extLst>
           </p:cNvPr>
           <p:cNvCxnSpPr>
+            <a:cxnSpLocks/>
             <a:stCxn id="27" idx="1"/>
           </p:cNvCxnSpPr>
           <p:nvPr/>
         </p:nvCxnSpPr>
         <p:spPr>
           <a:xfrm flipH="1" flipV="1">
-            <a:off x="4029230" y="5790530"/>
-            <a:ext cx="568268" cy="139550"/>
+            <a:off x="5650502" y="5391509"/>
+            <a:ext cx="594981" cy="178815"/>
           </a:xfrm>
           <a:prstGeom prst="straightConnector1">
             <a:avLst/>
@@ -4405,7 +4843,7 @@
         </p:nvSpPr>
         <p:spPr>
           <a:xfrm>
-            <a:off x="6509000" y="1899967"/>
+            <a:off x="10133852" y="907750"/>
             <a:ext cx="1703608" cy="738664"/>
           </a:xfrm>
           <a:prstGeom prst="rect">
@@ -4448,14 +4886,15 @@
             </a:extLst>
           </p:cNvPr>
           <p:cNvCxnSpPr>
+            <a:cxnSpLocks/>
             <a:stCxn id="28" idx="2"/>
           </p:cNvCxnSpPr>
           <p:nvPr/>
         </p:nvCxnSpPr>
         <p:spPr>
-          <a:xfrm>
-            <a:off x="7360804" y="2638631"/>
-            <a:ext cx="182996" cy="637115"/>
+          <a:xfrm flipH="1">
+            <a:off x="10446589" y="1646414"/>
+            <a:ext cx="539067" cy="329944"/>
           </a:xfrm>
           <a:prstGeom prst="straightConnector1">
             <a:avLst/>
@@ -4493,8 +4932,8 @@
         </p:nvSpPr>
         <p:spPr>
           <a:xfrm>
-            <a:off x="9918964" y="3632593"/>
-            <a:ext cx="1578574" cy="523220"/>
+            <a:off x="10761025" y="3845692"/>
+            <a:ext cx="987706" cy="738664"/>
           </a:xfrm>
           <a:prstGeom prst="rect">
             <a:avLst/>
@@ -4517,6 +4956,8 @@
               <a:rPr lang="en-AU" sz="1400" dirty="0"/>
               <a:t>Pandas/</a:t>
             </a:r>
+          </a:p>
+          <a:p>
             <a:r>
               <a:rPr lang="en-AU" sz="1400" dirty="0" err="1"/>
               <a:t>MatplotLib</a:t>
@@ -4541,13 +4982,809 @@
         </p:nvCxnSpPr>
         <p:spPr>
           <a:xfrm flipH="1" flipV="1">
-            <a:off x="9441873" y="3830782"/>
-            <a:ext cx="477091" cy="63421"/>
+            <a:off x="10283935" y="4043882"/>
+            <a:ext cx="477090" cy="171142"/>
           </a:xfrm>
           <a:prstGeom prst="straightConnector1">
             <a:avLst/>
           </a:prstGeom>
           <a:ln>
+            <a:tailEnd type="triangle"/>
+          </a:ln>
+        </p:spPr>
+        <p:style>
+          <a:lnRef idx="1">
+            <a:schemeClr val="accent1"/>
+          </a:lnRef>
+          <a:fillRef idx="0">
+            <a:schemeClr val="accent1"/>
+          </a:fillRef>
+          <a:effectRef idx="0">
+            <a:schemeClr val="accent1"/>
+          </a:effectRef>
+          <a:fontRef idx="minor">
+            <a:schemeClr val="tx1"/>
+          </a:fontRef>
+        </p:style>
+      </p:cxnSp>
+      <p:sp>
+        <p:nvSpPr>
+          <p:cNvPr id="29" name="Rectangle 28">
+            <a:extLst>
+              <a:ext uri="{FF2B5EF4-FFF2-40B4-BE49-F238E27FC236}">
+                <a16:creationId xmlns:a16="http://schemas.microsoft.com/office/drawing/2014/main" id="{37F14A70-6B34-4FDC-9FB1-3915B9C5BD47}"/>
+              </a:ext>
+            </a:extLst>
+          </p:cNvPr>
+          <p:cNvSpPr/>
+          <p:nvPr/>
+        </p:nvSpPr>
+        <p:spPr>
+          <a:xfrm>
+            <a:off x="2881219" y="665599"/>
+            <a:ext cx="2605447" cy="5849626"/>
+          </a:xfrm>
+          <a:prstGeom prst="rect">
+            <a:avLst/>
+          </a:prstGeom>
+          <a:noFill/>
+          <a:ln w="41275">
+            <a:prstDash val="dash"/>
+          </a:ln>
+        </p:spPr>
+        <p:style>
+          <a:lnRef idx="2">
+            <a:schemeClr val="accent1">
+              <a:shade val="50000"/>
+            </a:schemeClr>
+          </a:lnRef>
+          <a:fillRef idx="1">
+            <a:schemeClr val="accent1"/>
+          </a:fillRef>
+          <a:effectRef idx="0">
+            <a:schemeClr val="accent1"/>
+          </a:effectRef>
+          <a:fontRef idx="minor">
+            <a:schemeClr val="lt1"/>
+          </a:fontRef>
+        </p:style>
+        <p:txBody>
+          <a:bodyPr rtlCol="0" anchor="ctr"/>
+          <a:lstStyle/>
+          <a:p>
+            <a:pPr algn="ctr"/>
+            <a:endParaRPr lang="en-AU" dirty="0"/>
+          </a:p>
+        </p:txBody>
+      </p:sp>
+      <p:sp>
+        <p:nvSpPr>
+          <p:cNvPr id="32" name="Flowchart: Process 31">
+            <a:extLst>
+              <a:ext uri="{FF2B5EF4-FFF2-40B4-BE49-F238E27FC236}">
+                <a16:creationId xmlns:a16="http://schemas.microsoft.com/office/drawing/2014/main" id="{6C23F0B4-09AC-4EAF-8285-7AE5EF71FB47}"/>
+              </a:ext>
+            </a:extLst>
+          </p:cNvPr>
+          <p:cNvSpPr/>
+          <p:nvPr/>
+        </p:nvSpPr>
+        <p:spPr>
+          <a:xfrm>
+            <a:off x="3120504" y="5144673"/>
+            <a:ext cx="2060875" cy="1117121"/>
+          </a:xfrm>
+          <a:prstGeom prst="flowChartProcess">
+            <a:avLst/>
+          </a:prstGeom>
+          <a:solidFill>
+            <a:schemeClr val="accent4">
+              <a:lumMod val="60000"/>
+              <a:lumOff val="40000"/>
+            </a:schemeClr>
+          </a:solidFill>
+        </p:spPr>
+        <p:style>
+          <a:lnRef idx="2">
+            <a:schemeClr val="accent1">
+              <a:shade val="50000"/>
+            </a:schemeClr>
+          </a:lnRef>
+          <a:fillRef idx="1">
+            <a:schemeClr val="accent1"/>
+          </a:fillRef>
+          <a:effectRef idx="0">
+            <a:schemeClr val="accent1"/>
+          </a:effectRef>
+          <a:fontRef idx="minor">
+            <a:schemeClr val="lt1"/>
+          </a:fontRef>
+        </p:style>
+        <p:txBody>
+          <a:bodyPr rtlCol="0" anchor="ctr"/>
+          <a:lstStyle/>
+          <a:p>
+            <a:pPr algn="ctr"/>
+            <a:r>
+              <a:rPr lang="en-AU" dirty="0"/>
+              <a:t>Kinesis</a:t>
+            </a:r>
+          </a:p>
+        </p:txBody>
+      </p:sp>
+      <p:sp>
+        <p:nvSpPr>
+          <p:cNvPr id="34" name="Flowchart: Process 33">
+            <a:extLst>
+              <a:ext uri="{FF2B5EF4-FFF2-40B4-BE49-F238E27FC236}">
+                <a16:creationId xmlns:a16="http://schemas.microsoft.com/office/drawing/2014/main" id="{DF614A91-602A-4A1C-98C3-09A121AB760B}"/>
+              </a:ext>
+            </a:extLst>
+          </p:cNvPr>
+          <p:cNvSpPr/>
+          <p:nvPr/>
+        </p:nvSpPr>
+        <p:spPr>
+          <a:xfrm>
+            <a:off x="3110568" y="3118131"/>
+            <a:ext cx="2060875" cy="1117121"/>
+          </a:xfrm>
+          <a:prstGeom prst="flowChartProcess">
+            <a:avLst/>
+          </a:prstGeom>
+          <a:solidFill>
+            <a:schemeClr val="accent5">
+              <a:lumMod val="60000"/>
+              <a:lumOff val="40000"/>
+            </a:schemeClr>
+          </a:solidFill>
+        </p:spPr>
+        <p:style>
+          <a:lnRef idx="2">
+            <a:schemeClr val="accent1">
+              <a:shade val="50000"/>
+            </a:schemeClr>
+          </a:lnRef>
+          <a:fillRef idx="1">
+            <a:schemeClr val="accent1"/>
+          </a:fillRef>
+          <a:effectRef idx="0">
+            <a:schemeClr val="accent1"/>
+          </a:effectRef>
+          <a:fontRef idx="minor">
+            <a:schemeClr val="lt1"/>
+          </a:fontRef>
+        </p:style>
+        <p:txBody>
+          <a:bodyPr rtlCol="0" anchor="ctr"/>
+          <a:lstStyle/>
+          <a:p>
+            <a:pPr algn="ctr"/>
+            <a:r>
+              <a:rPr lang="en-AU" dirty="0"/>
+              <a:t>Flume</a:t>
+            </a:r>
+          </a:p>
+        </p:txBody>
+      </p:sp>
+      <p:sp>
+        <p:nvSpPr>
+          <p:cNvPr id="35" name="Flowchart: Process 34">
+            <a:extLst>
+              <a:ext uri="{FF2B5EF4-FFF2-40B4-BE49-F238E27FC236}">
+                <a16:creationId xmlns:a16="http://schemas.microsoft.com/office/drawing/2014/main" id="{CECE9315-E66C-4FB0-9544-C8AB01CD996F}"/>
+              </a:ext>
+            </a:extLst>
+          </p:cNvPr>
+          <p:cNvSpPr/>
+          <p:nvPr/>
+        </p:nvSpPr>
+        <p:spPr>
+          <a:xfrm>
+            <a:off x="3110569" y="1116001"/>
+            <a:ext cx="2060875" cy="1117121"/>
+          </a:xfrm>
+          <a:prstGeom prst="flowChartProcess">
+            <a:avLst/>
+          </a:prstGeom>
+          <a:solidFill>
+            <a:schemeClr val="accent6">
+              <a:lumMod val="60000"/>
+              <a:lumOff val="40000"/>
+            </a:schemeClr>
+          </a:solidFill>
+        </p:spPr>
+        <p:style>
+          <a:lnRef idx="2">
+            <a:schemeClr val="accent1">
+              <a:shade val="50000"/>
+            </a:schemeClr>
+          </a:lnRef>
+          <a:fillRef idx="1">
+            <a:schemeClr val="accent1"/>
+          </a:fillRef>
+          <a:effectRef idx="0">
+            <a:schemeClr val="accent1"/>
+          </a:effectRef>
+          <a:fontRef idx="minor">
+            <a:schemeClr val="lt1"/>
+          </a:fontRef>
+        </p:style>
+        <p:txBody>
+          <a:bodyPr rtlCol="0" anchor="ctr"/>
+          <a:lstStyle/>
+          <a:p>
+            <a:pPr algn="ctr"/>
+            <a:r>
+              <a:rPr lang="en-AU" dirty="0"/>
+              <a:t>Kafka</a:t>
+            </a:r>
+          </a:p>
+        </p:txBody>
+      </p:sp>
+      <p:cxnSp>
+        <p:nvCxnSpPr>
+          <p:cNvPr id="36" name="Connector: Elbow 35">
+            <a:extLst>
+              <a:ext uri="{FF2B5EF4-FFF2-40B4-BE49-F238E27FC236}">
+                <a16:creationId xmlns:a16="http://schemas.microsoft.com/office/drawing/2014/main" id="{27A6128C-C8C6-4498-99D9-7FDDC05226E2}"/>
+              </a:ext>
+            </a:extLst>
+          </p:cNvPr>
+          <p:cNvCxnSpPr>
+            <a:cxnSpLocks/>
+            <a:stCxn id="15" idx="3"/>
+            <a:endCxn id="34" idx="1"/>
+          </p:cNvCxnSpPr>
+          <p:nvPr/>
+        </p:nvCxnSpPr>
+        <p:spPr>
+          <a:xfrm flipV="1">
+            <a:off x="2215940" y="3676692"/>
+            <a:ext cx="894628" cy="156114"/>
+          </a:xfrm>
+          <a:prstGeom prst="bentConnector3">
+            <a:avLst>
+              <a:gd name="adj1" fmla="val 50000"/>
+            </a:avLst>
+          </a:prstGeom>
+          <a:ln w="73025">
+            <a:solidFill>
+              <a:schemeClr val="accent2"/>
+            </a:solidFill>
+            <a:tailEnd type="triangle"/>
+          </a:ln>
+        </p:spPr>
+        <p:style>
+          <a:lnRef idx="1">
+            <a:schemeClr val="accent1"/>
+          </a:lnRef>
+          <a:fillRef idx="0">
+            <a:schemeClr val="accent1"/>
+          </a:fillRef>
+          <a:effectRef idx="0">
+            <a:schemeClr val="accent1"/>
+          </a:effectRef>
+          <a:fontRef idx="minor">
+            <a:schemeClr val="tx1"/>
+          </a:fontRef>
+        </p:style>
+      </p:cxnSp>
+      <p:cxnSp>
+        <p:nvCxnSpPr>
+          <p:cNvPr id="39" name="Connector: Elbow 38">
+            <a:extLst>
+              <a:ext uri="{FF2B5EF4-FFF2-40B4-BE49-F238E27FC236}">
+                <a16:creationId xmlns:a16="http://schemas.microsoft.com/office/drawing/2014/main" id="{1F5E94C9-2B32-4C07-8567-D153904F3688}"/>
+              </a:ext>
+            </a:extLst>
+          </p:cNvPr>
+          <p:cNvCxnSpPr>
+            <a:cxnSpLocks/>
+            <a:stCxn id="15" idx="3"/>
+            <a:endCxn id="32" idx="1"/>
+          </p:cNvCxnSpPr>
+          <p:nvPr/>
+        </p:nvCxnSpPr>
+        <p:spPr>
+          <a:xfrm>
+            <a:off x="2215940" y="3832806"/>
+            <a:ext cx="904564" cy="1870428"/>
+          </a:xfrm>
+          <a:prstGeom prst="bentConnector3">
+            <a:avLst>
+              <a:gd name="adj1" fmla="val 50000"/>
+            </a:avLst>
+          </a:prstGeom>
+          <a:ln w="73025">
+            <a:solidFill>
+              <a:schemeClr val="accent2"/>
+            </a:solidFill>
+            <a:tailEnd type="triangle"/>
+          </a:ln>
+        </p:spPr>
+        <p:style>
+          <a:lnRef idx="1">
+            <a:schemeClr val="accent1"/>
+          </a:lnRef>
+          <a:fillRef idx="0">
+            <a:schemeClr val="accent1"/>
+          </a:fillRef>
+          <a:effectRef idx="0">
+            <a:schemeClr val="accent1"/>
+          </a:effectRef>
+          <a:fontRef idx="minor">
+            <a:schemeClr val="tx1"/>
+          </a:fontRef>
+        </p:style>
+      </p:cxnSp>
+      <p:cxnSp>
+        <p:nvCxnSpPr>
+          <p:cNvPr id="44" name="Connector: Elbow 43">
+            <a:extLst>
+              <a:ext uri="{FF2B5EF4-FFF2-40B4-BE49-F238E27FC236}">
+                <a16:creationId xmlns:a16="http://schemas.microsoft.com/office/drawing/2014/main" id="{9EF16D6C-B24F-45B7-AF62-28009F94091A}"/>
+              </a:ext>
+            </a:extLst>
+          </p:cNvPr>
+          <p:cNvCxnSpPr>
+            <a:cxnSpLocks/>
+            <a:stCxn id="34" idx="3"/>
+            <a:endCxn id="21" idx="1"/>
+          </p:cNvCxnSpPr>
+          <p:nvPr/>
+        </p:nvCxnSpPr>
+        <p:spPr>
+          <a:xfrm>
+            <a:off x="5171443" y="3676692"/>
+            <a:ext cx="895745" cy="521683"/>
+          </a:xfrm>
+          <a:prstGeom prst="bentConnector3">
+            <a:avLst>
+              <a:gd name="adj1" fmla="val 50000"/>
+            </a:avLst>
+          </a:prstGeom>
+          <a:ln w="73025">
+            <a:solidFill>
+              <a:schemeClr val="accent2"/>
+            </a:solidFill>
+            <a:tailEnd type="triangle"/>
+          </a:ln>
+        </p:spPr>
+        <p:style>
+          <a:lnRef idx="1">
+            <a:schemeClr val="accent1"/>
+          </a:lnRef>
+          <a:fillRef idx="0">
+            <a:schemeClr val="accent1"/>
+          </a:fillRef>
+          <a:effectRef idx="0">
+            <a:schemeClr val="accent1"/>
+          </a:effectRef>
+          <a:fontRef idx="minor">
+            <a:schemeClr val="tx1"/>
+          </a:fontRef>
+        </p:style>
+      </p:cxnSp>
+      <p:cxnSp>
+        <p:nvCxnSpPr>
+          <p:cNvPr id="48" name="Connector: Elbow 47">
+            <a:extLst>
+              <a:ext uri="{FF2B5EF4-FFF2-40B4-BE49-F238E27FC236}">
+                <a16:creationId xmlns:a16="http://schemas.microsoft.com/office/drawing/2014/main" id="{A7EDF8A3-9C2C-4AAF-8D1F-2F1BCF9AB21D}"/>
+              </a:ext>
+            </a:extLst>
+          </p:cNvPr>
+          <p:cNvCxnSpPr>
+            <a:cxnSpLocks/>
+            <a:stCxn id="35" idx="3"/>
+            <a:endCxn id="21" idx="1"/>
+          </p:cNvCxnSpPr>
+          <p:nvPr/>
+        </p:nvCxnSpPr>
+        <p:spPr>
+          <a:xfrm>
+            <a:off x="5171444" y="1674562"/>
+            <a:ext cx="895744" cy="2523813"/>
+          </a:xfrm>
+          <a:prstGeom prst="bentConnector3">
+            <a:avLst>
+              <a:gd name="adj1" fmla="val 50000"/>
+            </a:avLst>
+          </a:prstGeom>
+          <a:ln w="73025">
+            <a:solidFill>
+              <a:schemeClr val="accent2"/>
+            </a:solidFill>
+            <a:tailEnd type="triangle"/>
+          </a:ln>
+        </p:spPr>
+        <p:style>
+          <a:lnRef idx="1">
+            <a:schemeClr val="accent1"/>
+          </a:lnRef>
+          <a:fillRef idx="0">
+            <a:schemeClr val="accent1"/>
+          </a:fillRef>
+          <a:effectRef idx="0">
+            <a:schemeClr val="accent1"/>
+          </a:effectRef>
+          <a:fontRef idx="minor">
+            <a:schemeClr val="tx1"/>
+          </a:fontRef>
+        </p:style>
+      </p:cxnSp>
+      <p:cxnSp>
+        <p:nvCxnSpPr>
+          <p:cNvPr id="51" name="Connector: Elbow 50">
+            <a:extLst>
+              <a:ext uri="{FF2B5EF4-FFF2-40B4-BE49-F238E27FC236}">
+                <a16:creationId xmlns:a16="http://schemas.microsoft.com/office/drawing/2014/main" id="{EF99D03B-D2FA-4A12-9A99-64D84401CAF1}"/>
+              </a:ext>
+            </a:extLst>
+          </p:cNvPr>
+          <p:cNvCxnSpPr>
+            <a:cxnSpLocks/>
+            <a:stCxn id="32" idx="3"/>
+            <a:endCxn id="21" idx="1"/>
+          </p:cNvCxnSpPr>
+          <p:nvPr/>
+        </p:nvCxnSpPr>
+        <p:spPr>
+          <a:xfrm flipV="1">
+            <a:off x="5181379" y="4198375"/>
+            <a:ext cx="885809" cy="1504859"/>
+          </a:xfrm>
+          <a:prstGeom prst="bentConnector3">
+            <a:avLst>
+              <a:gd name="adj1" fmla="val 50000"/>
+            </a:avLst>
+          </a:prstGeom>
+          <a:ln w="73025">
+            <a:solidFill>
+              <a:schemeClr val="accent2"/>
+            </a:solidFill>
+            <a:tailEnd type="triangle"/>
+          </a:ln>
+        </p:spPr>
+        <p:style>
+          <a:lnRef idx="1">
+            <a:schemeClr val="accent1"/>
+          </a:lnRef>
+          <a:fillRef idx="0">
+            <a:schemeClr val="accent1"/>
+          </a:fillRef>
+          <a:effectRef idx="0">
+            <a:schemeClr val="accent1"/>
+          </a:effectRef>
+          <a:fontRef idx="minor">
+            <a:schemeClr val="tx1"/>
+          </a:fontRef>
+        </p:style>
+      </p:cxnSp>
+      <p:sp>
+        <p:nvSpPr>
+          <p:cNvPr id="54" name="TextBox 53">
+            <a:extLst>
+              <a:ext uri="{FF2B5EF4-FFF2-40B4-BE49-F238E27FC236}">
+                <a16:creationId xmlns:a16="http://schemas.microsoft.com/office/drawing/2014/main" id="{CBB23B1D-84F7-4DCF-8A46-85E5C35D09A5}"/>
+              </a:ext>
+            </a:extLst>
+          </p:cNvPr>
+          <p:cNvSpPr txBox="1"/>
+          <p:nvPr/>
+        </p:nvSpPr>
+        <p:spPr>
+          <a:xfrm>
+            <a:off x="3338114" y="746669"/>
+            <a:ext cx="1611210" cy="369332"/>
+          </a:xfrm>
+          <a:prstGeom prst="rect">
+            <a:avLst/>
+          </a:prstGeom>
+          <a:noFill/>
+        </p:spPr>
+        <p:txBody>
+          <a:bodyPr wrap="none" rtlCol="0">
+            <a:spAutoFit/>
+          </a:bodyPr>
+          <a:lstStyle/>
+          <a:p>
+            <a:r>
+              <a:rPr lang="en-AU" dirty="0"/>
+              <a:t>Data Collection</a:t>
+            </a:r>
+          </a:p>
+        </p:txBody>
+      </p:sp>
+      <p:sp>
+        <p:nvSpPr>
+          <p:cNvPr id="60" name="TextBox 59">
+            <a:extLst>
+              <a:ext uri="{FF2B5EF4-FFF2-40B4-BE49-F238E27FC236}">
+                <a16:creationId xmlns:a16="http://schemas.microsoft.com/office/drawing/2014/main" id="{80F804BE-B770-4CEA-B8B0-9EBA1B0AEBA4}"/>
+              </a:ext>
+            </a:extLst>
+          </p:cNvPr>
+          <p:cNvSpPr txBox="1"/>
+          <p:nvPr/>
+        </p:nvSpPr>
+        <p:spPr>
+          <a:xfrm>
+            <a:off x="1601949" y="51191"/>
+            <a:ext cx="1525482" cy="523220"/>
+          </a:xfrm>
+          <a:prstGeom prst="rect">
+            <a:avLst/>
+          </a:prstGeom>
+          <a:noFill/>
+        </p:spPr>
+        <p:txBody>
+          <a:bodyPr wrap="none" rtlCol="0">
+            <a:spAutoFit/>
+          </a:bodyPr>
+          <a:lstStyle/>
+          <a:p>
+            <a:r>
+              <a:rPr lang="en-AU" sz="1400" dirty="0"/>
+              <a:t>Data ingestion via </a:t>
+            </a:r>
+          </a:p>
+          <a:p>
+            <a:r>
+              <a:rPr lang="en-AU" sz="1400" dirty="0"/>
+              <a:t>exposed topics</a:t>
+            </a:r>
+          </a:p>
+        </p:txBody>
+      </p:sp>
+      <p:cxnSp>
+        <p:nvCxnSpPr>
+          <p:cNvPr id="61" name="Straight Arrow Connector 60">
+            <a:extLst>
+              <a:ext uri="{FF2B5EF4-FFF2-40B4-BE49-F238E27FC236}">
+                <a16:creationId xmlns:a16="http://schemas.microsoft.com/office/drawing/2014/main" id="{C58100A8-8C70-46F5-AF6D-1651A9EAE1E1}"/>
+              </a:ext>
+            </a:extLst>
+          </p:cNvPr>
+          <p:cNvCxnSpPr>
+            <a:cxnSpLocks/>
+            <a:stCxn id="60" idx="2"/>
+          </p:cNvCxnSpPr>
+          <p:nvPr/>
+        </p:nvCxnSpPr>
+        <p:spPr>
+          <a:xfrm>
+            <a:off x="2364690" y="574411"/>
+            <a:ext cx="352693" cy="1004223"/>
+          </a:xfrm>
+          <a:prstGeom prst="straightConnector1">
+            <a:avLst/>
+          </a:prstGeom>
+          <a:ln>
+            <a:tailEnd type="triangle"/>
+          </a:ln>
+        </p:spPr>
+        <p:style>
+          <a:lnRef idx="1">
+            <a:schemeClr val="accent1"/>
+          </a:lnRef>
+          <a:fillRef idx="0">
+            <a:schemeClr val="accent1"/>
+          </a:fillRef>
+          <a:effectRef idx="0">
+            <a:schemeClr val="accent1"/>
+          </a:effectRef>
+          <a:fontRef idx="minor">
+            <a:schemeClr val="tx1"/>
+          </a:fontRef>
+        </p:style>
+      </p:cxnSp>
+      <p:sp>
+        <p:nvSpPr>
+          <p:cNvPr id="64" name="Flowchart: Process 63">
+            <a:extLst>
+              <a:ext uri="{FF2B5EF4-FFF2-40B4-BE49-F238E27FC236}">
+                <a16:creationId xmlns:a16="http://schemas.microsoft.com/office/drawing/2014/main" id="{29195666-7E21-457A-ABFE-97E71AE8746C}"/>
+              </a:ext>
+            </a:extLst>
+          </p:cNvPr>
+          <p:cNvSpPr/>
+          <p:nvPr/>
+        </p:nvSpPr>
+        <p:spPr>
+          <a:xfrm>
+            <a:off x="6826005" y="1194555"/>
+            <a:ext cx="2060875" cy="1117121"/>
+          </a:xfrm>
+          <a:prstGeom prst="flowChartProcess">
+            <a:avLst/>
+          </a:prstGeom>
+        </p:spPr>
+        <p:style>
+          <a:lnRef idx="2">
+            <a:schemeClr val="accent1">
+              <a:shade val="50000"/>
+            </a:schemeClr>
+          </a:lnRef>
+          <a:fillRef idx="1">
+            <a:schemeClr val="accent1"/>
+          </a:fillRef>
+          <a:effectRef idx="0">
+            <a:schemeClr val="accent1"/>
+          </a:effectRef>
+          <a:fontRef idx="minor">
+            <a:schemeClr val="lt1"/>
+          </a:fontRef>
+        </p:style>
+        <p:txBody>
+          <a:bodyPr rtlCol="0" anchor="ctr"/>
+          <a:lstStyle/>
+          <a:p>
+            <a:pPr algn="ctr"/>
+            <a:r>
+              <a:rPr lang="en-AU" dirty="0"/>
+              <a:t>HBASE</a:t>
+            </a:r>
+          </a:p>
+          <a:p>
+            <a:pPr algn="ctr"/>
+            <a:r>
+              <a:rPr lang="en-AU" dirty="0"/>
+              <a:t>MAPR-FS</a:t>
+            </a:r>
+          </a:p>
+          <a:p>
+            <a:pPr algn="ctr"/>
+            <a:r>
+              <a:rPr lang="en-AU" dirty="0"/>
+              <a:t>MAPR-DB</a:t>
+            </a:r>
+          </a:p>
+        </p:txBody>
+      </p:sp>
+      <p:cxnSp>
+        <p:nvCxnSpPr>
+          <p:cNvPr id="66" name="Connector: Elbow 65">
+            <a:extLst>
+              <a:ext uri="{FF2B5EF4-FFF2-40B4-BE49-F238E27FC236}">
+                <a16:creationId xmlns:a16="http://schemas.microsoft.com/office/drawing/2014/main" id="{04470AEC-63FE-4A04-B3DF-0264A96C8AE5}"/>
+              </a:ext>
+            </a:extLst>
+          </p:cNvPr>
+          <p:cNvCxnSpPr>
+            <a:cxnSpLocks/>
+            <a:stCxn id="64" idx="3"/>
+            <a:endCxn id="19" idx="0"/>
+          </p:cNvCxnSpPr>
+          <p:nvPr/>
+        </p:nvCxnSpPr>
+        <p:spPr>
+          <a:xfrm>
+            <a:off x="8886880" y="1753116"/>
+            <a:ext cx="1348241" cy="645511"/>
+          </a:xfrm>
+          <a:prstGeom prst="bentConnector2">
+            <a:avLst/>
+          </a:prstGeom>
+          <a:ln w="73025">
+            <a:solidFill>
+              <a:schemeClr val="accent2"/>
+            </a:solidFill>
+            <a:tailEnd type="triangle"/>
+          </a:ln>
+        </p:spPr>
+        <p:style>
+          <a:lnRef idx="1">
+            <a:schemeClr val="accent1"/>
+          </a:lnRef>
+          <a:fillRef idx="0">
+            <a:schemeClr val="accent1"/>
+          </a:fillRef>
+          <a:effectRef idx="0">
+            <a:schemeClr val="accent1"/>
+          </a:effectRef>
+          <a:fontRef idx="minor">
+            <a:schemeClr val="tx1"/>
+          </a:fontRef>
+        </p:style>
+      </p:cxnSp>
+      <p:sp>
+        <p:nvSpPr>
+          <p:cNvPr id="57" name="Flowchart: Process 56">
+            <a:extLst>
+              <a:ext uri="{FF2B5EF4-FFF2-40B4-BE49-F238E27FC236}">
+                <a16:creationId xmlns:a16="http://schemas.microsoft.com/office/drawing/2014/main" id="{02934A7A-3104-4724-BBD3-5819A2E4CD35}"/>
+              </a:ext>
+            </a:extLst>
+          </p:cNvPr>
+          <p:cNvSpPr/>
+          <p:nvPr/>
+        </p:nvSpPr>
+        <p:spPr>
+          <a:xfrm>
+            <a:off x="307738" y="5191882"/>
+            <a:ext cx="2060875" cy="1117121"/>
+          </a:xfrm>
+          <a:prstGeom prst="flowChartProcess">
+            <a:avLst/>
+          </a:prstGeom>
+        </p:spPr>
+        <p:style>
+          <a:lnRef idx="2">
+            <a:schemeClr val="accent1">
+              <a:shade val="50000"/>
+            </a:schemeClr>
+          </a:lnRef>
+          <a:fillRef idx="1">
+            <a:schemeClr val="accent1"/>
+          </a:fillRef>
+          <a:effectRef idx="0">
+            <a:schemeClr val="accent1"/>
+          </a:effectRef>
+          <a:fontRef idx="minor">
+            <a:schemeClr val="lt1"/>
+          </a:fontRef>
+        </p:style>
+        <p:txBody>
+          <a:bodyPr rtlCol="0" anchor="ctr"/>
+          <a:lstStyle/>
+          <a:p>
+            <a:pPr algn="ctr"/>
+            <a:r>
+              <a:rPr lang="en-AU" dirty="0"/>
+              <a:t>Google </a:t>
+            </a:r>
+            <a:r>
+              <a:rPr lang="en-AU" dirty="0" err="1"/>
+              <a:t>BigQuery</a:t>
+            </a:r>
+            <a:endParaRPr lang="en-AU" dirty="0"/>
+          </a:p>
+          <a:p>
+            <a:pPr algn="ctr"/>
+            <a:r>
+              <a:rPr lang="en-AU" dirty="0"/>
+              <a:t>(</a:t>
+            </a:r>
+            <a:r>
+              <a:rPr lang="en-AU" dirty="0" err="1"/>
+              <a:t>hacker_news_db</a:t>
+            </a:r>
+            <a:r>
+              <a:rPr lang="en-AU" dirty="0"/>
+              <a:t>)</a:t>
+            </a:r>
+          </a:p>
+        </p:txBody>
+      </p:sp>
+      <p:cxnSp>
+        <p:nvCxnSpPr>
+          <p:cNvPr id="58" name="Connector: Elbow 57">
+            <a:extLst>
+              <a:ext uri="{FF2B5EF4-FFF2-40B4-BE49-F238E27FC236}">
+                <a16:creationId xmlns:a16="http://schemas.microsoft.com/office/drawing/2014/main" id="{E7F39E0A-44FF-437C-AD5A-D8AC5D8DE392}"/>
+              </a:ext>
+            </a:extLst>
+          </p:cNvPr>
+          <p:cNvCxnSpPr>
+            <a:cxnSpLocks/>
+            <a:stCxn id="57" idx="0"/>
+          </p:cNvCxnSpPr>
+          <p:nvPr/>
+        </p:nvCxnSpPr>
+        <p:spPr>
+          <a:xfrm rot="5400000" flipH="1" flipV="1">
+            <a:off x="1677937" y="4206565"/>
+            <a:ext cx="645557" cy="1325078"/>
+          </a:xfrm>
+          <a:prstGeom prst="bentConnector2">
+            <a:avLst/>
+          </a:prstGeom>
+          <a:ln w="73025">
+            <a:solidFill>
+              <a:schemeClr val="accent2"/>
+            </a:solidFill>
             <a:tailEnd type="triangle"/>
           </a:ln>
         </p:spPr>

</xml_diff>